<commit_message>
Corrected BSc project slides
</commit_message>
<xml_diff>
--- a/SavingsFundsManagementSystems/SavingsFundsManagementSystems_Presentation.pptx
+++ b/SavingsFundsManagementSystems/SavingsFundsManagementSystems_Presentation.pptx
@@ -248,7 +248,7 @@
           <a:p>
             <a:fld id="{DD4556CF-D4FB-4838-8122-5FB36ECE4D6D}" type="datetimeFigureOut">
               <a:rPr lang="en-US" smtClean="0"/>
-              <a:t>2023-12-12</a:t>
+              <a:t>2024-03-17</a:t>
             </a:fld>
             <a:endParaRPr lang="en-US"/>
           </a:p>
@@ -426,7 +426,7 @@
           <a:p>
             <a:fld id="{80DE4C5B-F094-4317-A086-A3CE3FD5C2D2}" type="datetimeFigureOut">
               <a:rPr lang="en-US" smtClean="0"/>
-              <a:t>2023-12-12</a:t>
+              <a:t>2024-03-17</a:t>
             </a:fld>
             <a:endParaRPr lang="en-US"/>
           </a:p>
@@ -1446,7 +1446,7 @@
           <a:p>
             <a:fld id="{F41501E6-B28A-4F01-94C6-8364E09D2668}" type="datetime1">
               <a:rPr lang="en-US" smtClean="0"/>
-              <a:t>2023-12-12</a:t>
+              <a:t>2024-03-17</a:t>
             </a:fld>
             <a:endParaRPr lang="en-US"/>
           </a:p>
@@ -1692,7 +1692,7 @@
           <a:p>
             <a:fld id="{2C6051DB-53DC-4589-AC5D-2CBB281E5DE3}" type="datetime1">
               <a:rPr lang="en-US" smtClean="0"/>
-              <a:t>2023-12-12</a:t>
+              <a:t>2024-03-17</a:t>
             </a:fld>
             <a:endParaRPr lang="en-US"/>
           </a:p>
@@ -1905,7 +1905,7 @@
           <a:p>
             <a:fld id="{6E182289-E7FF-4687-8F4C-E1A2277B8490}" type="datetime1">
               <a:rPr lang="en-US" smtClean="0"/>
-              <a:t>2023-12-12</a:t>
+              <a:t>2024-03-17</a:t>
             </a:fld>
             <a:endParaRPr lang="en-US"/>
           </a:p>
@@ -2108,7 +2108,7 @@
           <a:p>
             <a:fld id="{8BC3B4E2-D8B6-4CD6-A24B-BBD0E90E3BF7}" type="datetime1">
               <a:rPr lang="en-US" smtClean="0"/>
-              <a:t>2023-12-12</a:t>
+              <a:t>2024-03-17</a:t>
             </a:fld>
             <a:endParaRPr lang="en-US"/>
           </a:p>
@@ -2392,7 +2392,7 @@
           <a:p>
             <a:fld id="{DDB80E52-DB89-4D17-9003-4B8B93379DB0}" type="datetime1">
               <a:rPr lang="en-US" smtClean="0"/>
-              <a:t>2023-12-12</a:t>
+              <a:t>2024-03-17</a:t>
             </a:fld>
             <a:endParaRPr lang="en-US"/>
           </a:p>
@@ -2748,7 +2748,7 @@
           <a:p>
             <a:fld id="{F6C19AA9-BF93-40C1-AF3C-293CB4DDDD43}" type="datetime1">
               <a:rPr lang="en-US" smtClean="0"/>
-              <a:t>2023-12-12</a:t>
+              <a:t>2024-03-17</a:t>
             </a:fld>
             <a:endParaRPr lang="en-US"/>
           </a:p>
@@ -3205,7 +3205,7 @@
           <a:p>
             <a:fld id="{026538FA-7CB5-4988-A21A-F5ACF4615525}" type="datetime1">
               <a:rPr lang="en-US" smtClean="0"/>
-              <a:t>2023-12-12</a:t>
+              <a:t>2024-03-17</a:t>
             </a:fld>
             <a:endParaRPr lang="en-US"/>
           </a:p>
@@ -3356,7 +3356,7 @@
           <a:p>
             <a:fld id="{A0094EA9-8A2B-4857-9529-835E9AA2DA3C}" type="datetime1">
               <a:rPr lang="en-US" smtClean="0"/>
-              <a:t>2023-12-12</a:t>
+              <a:t>2024-03-17</a:t>
             </a:fld>
             <a:endParaRPr lang="en-US"/>
           </a:p>
@@ -3484,7 +3484,7 @@
           <a:p>
             <a:fld id="{9F5B248B-00E5-4205-9EE5-F9F5B8E41D59}" type="datetime1">
               <a:rPr lang="en-US" smtClean="0"/>
-              <a:t>2023-12-12</a:t>
+              <a:t>2024-03-17</a:t>
             </a:fld>
             <a:endParaRPr lang="en-US"/>
           </a:p>
@@ -3807,7 +3807,7 @@
           <a:p>
             <a:fld id="{AF9C6E05-EFC3-4F54-A69B-B98931E86CDE}" type="datetime1">
               <a:rPr lang="en-US" smtClean="0"/>
-              <a:t>2023-12-12</a:t>
+              <a:t>2024-03-17</a:t>
             </a:fld>
             <a:endParaRPr lang="en-US"/>
           </a:p>
@@ -4112,7 +4112,7 @@
           <a:p>
             <a:fld id="{475F6B40-2DCD-4260-8680-82BFC5D42454}" type="datetime1">
               <a:rPr lang="en-US" smtClean="0"/>
-              <a:t>2023-12-12</a:t>
+              <a:t>2024-03-17</a:t>
             </a:fld>
             <a:endParaRPr lang="en-US"/>
           </a:p>
@@ -4398,7 +4398,7 @@
           <a:p>
             <a:fld id="{FF768B9F-B054-41B8-A4D2-73A4E2190DC3}" type="datetime1">
               <a:rPr lang="en-US" smtClean="0"/>
-              <a:t>2023-12-12</a:t>
+              <a:t>2024-03-17</a:t>
             </a:fld>
             <a:endParaRPr lang="en-US"/>
           </a:p>
@@ -5268,7 +5268,7 @@
                 <a:latin typeface="Times New Roman" panose="02020603050405020304" pitchFamily="18" charset="0"/>
                 <a:cs typeface="B Nazanin" panose="00000400000000000000" pitchFamily="2" charset="-78"/>
               </a:rPr>
-              <a:t>Database selection</a:t>
+              <a:t>Database Selection</a:t>
             </a:r>
             <a:endParaRPr lang="fa-IR" sz="2400" dirty="0">
               <a:solidFill>
@@ -5370,7 +5370,7 @@
             </a:endParaRPr>
           </a:p>
           <a:p>
-            <a:pPr algn="l">
+            <a:pPr>
               <a:lnSpc>
                 <a:spcPct val="150000"/>
               </a:lnSpc>
@@ -5383,15 +5383,8 @@
                 <a:latin typeface="Times New Roman" panose="02020603050405020304" pitchFamily="18" charset="0"/>
                 <a:cs typeface="B Nazanin" panose="00000400000000000000" pitchFamily="2" charset="-78"/>
               </a:rPr>
-              <a:t>Relational database management system selection</a:t>
-            </a:r>
-            <a:endParaRPr lang="fa-IR" sz="2400" dirty="0">
-              <a:solidFill>
-                <a:schemeClr val="tx1"/>
-              </a:solidFill>
-              <a:latin typeface="Times New Roman" panose="02020603050405020304" pitchFamily="18" charset="0"/>
-              <a:cs typeface="B Nazanin" panose="00000400000000000000" pitchFamily="2" charset="-78"/>
-            </a:endParaRPr>
+              <a:t>Relational Database Management System Selection</a:t>
+            </a:r>
           </a:p>
         </p:txBody>
       </p:sp>
@@ -7429,7 +7422,7 @@
                 <a:latin typeface="Times New Roman" panose="02020603050405020304" pitchFamily="18" charset="0"/>
                 <a:cs typeface="B Nazanin" panose="00000400000000000000" pitchFamily="2" charset="-78"/>
               </a:rPr>
-              <a:t>Using the Golang-Migrate library to manage database changes and versions</a:t>
+              <a:t>Utilizing the Golang-Migrate library for managing database changes and versions</a:t>
             </a:r>
           </a:p>
           <a:p>
@@ -7441,7 +7434,7 @@
                 <a:latin typeface="Times New Roman" panose="02020603050405020304" pitchFamily="18" charset="0"/>
                 <a:cs typeface="B Nazanin" panose="00000400000000000000" pitchFamily="2" charset="-78"/>
               </a:rPr>
-              <a:t>Not using raw SQL and choosing an ORM framework for Go</a:t>
+              <a:t>Opting for an ORM (Object-Relational Mapping) framework for Go instead of raw SQL</a:t>
             </a:r>
             <a:endParaRPr lang="fa-IR" sz="2400" dirty="0">
               <a:solidFill>
@@ -7943,15 +7936,8 @@
                 <a:latin typeface="Times New Roman" panose="02020603050405020304" pitchFamily="18" charset="0"/>
                 <a:cs typeface="B Nazanin" panose="00000400000000000000" pitchFamily="2" charset="-78"/>
               </a:rPr>
-              <a:t>The financial nature of the savings fund management system</a:t>
-            </a:r>
-            <a:endParaRPr lang="fa-IR" sz="2400" dirty="0">
-              <a:solidFill>
-                <a:schemeClr val="tx1"/>
-              </a:solidFill>
-              <a:latin typeface="Times New Roman" panose="02020603050405020304" pitchFamily="18" charset="0"/>
-              <a:cs typeface="B Nazanin" panose="00000400000000000000" pitchFamily="2" charset="-78"/>
-            </a:endParaRPr>
+              <a:t>Considering the financial nature of the savings fund management system</a:t>
+            </a:r>
           </a:p>
           <a:p>
             <a:r>
@@ -7962,15 +7948,8 @@
                 <a:latin typeface="Times New Roman" panose="02020603050405020304" pitchFamily="18" charset="0"/>
                 <a:cs typeface="B Nazanin" panose="00000400000000000000" pitchFamily="2" charset="-78"/>
               </a:rPr>
-              <a:t>Transactional approach</a:t>
-            </a:r>
-            <a:endParaRPr lang="fa-IR" sz="2400" dirty="0">
-              <a:solidFill>
-                <a:schemeClr val="tx1"/>
-              </a:solidFill>
-              <a:latin typeface="Times New Roman" panose="02020603050405020304" pitchFamily="18" charset="0"/>
-              <a:cs typeface="B Nazanin" panose="00000400000000000000" pitchFamily="2" charset="-78"/>
-            </a:endParaRPr>
+              <a:t>Adopting a transactional approach</a:t>
+            </a:r>
           </a:p>
           <a:p>
             <a:pPr lvl="1">
@@ -7985,7 +7964,7 @@
                 <a:latin typeface="Times New Roman" panose="02020603050405020304" pitchFamily="18" charset="0"/>
                 <a:cs typeface="B Nazanin" panose="00000400000000000000" pitchFamily="2" charset="-78"/>
               </a:rPr>
-              <a:t>A unit of work consists of several database queries</a:t>
+              <a:t>A unit of work comprises multiple database queries</a:t>
             </a:r>
           </a:p>
           <a:p>
@@ -8001,7 +7980,7 @@
                 <a:latin typeface="Times New Roman" panose="02020603050405020304" pitchFamily="18" charset="0"/>
                 <a:cs typeface="B Nazanin" panose="00000400000000000000" pitchFamily="2" charset="-78"/>
               </a:rPr>
-              <a:t>Ensuring that the operation is completed or the whole set is rolled back</a:t>
+              <a:t>Ensuring completion of the operation or rolling back the entire set</a:t>
             </a:r>
           </a:p>
           <a:p>
@@ -8017,23 +7996,7 @@
                 <a:latin typeface="Times New Roman" panose="02020603050405020304" pitchFamily="18" charset="0"/>
                 <a:cs typeface="B Nazanin" panose="00000400000000000000" pitchFamily="2" charset="-78"/>
               </a:rPr>
-              <a:t>Maintain data integrity</a:t>
-            </a:r>
-          </a:p>
-          <a:p>
-            <a:pPr lvl="1">
-              <a:buFont typeface="Courier New" panose="02070309020205020404" pitchFamily="49" charset="0"/>
-              <a:buChar char="o"/>
-            </a:pPr>
-            <a:r>
-              <a:rPr lang="en-US" sz="2200" dirty="0">
-                <a:solidFill>
-                  <a:schemeClr val="tx1"/>
-                </a:solidFill>
-                <a:latin typeface="Times New Roman" panose="02020603050405020304" pitchFamily="18" charset="0"/>
-                <a:cs typeface="B Nazanin" panose="00000400000000000000" pitchFamily="2" charset="-78"/>
-              </a:rPr>
-              <a:t>Avoiding anomalies</a:t>
+              <a:t>Maintaining data integrity and avoiding anomalies</a:t>
             </a:r>
             <a:endParaRPr lang="fa-IR" sz="2200" dirty="0">
               <a:solidFill>
@@ -8052,7 +8015,7 @@
                 <a:latin typeface="Times New Roman" panose="02020603050405020304" pitchFamily="18" charset="0"/>
                 <a:cs typeface="B Nazanin" panose="00000400000000000000" pitchFamily="2" charset="-78"/>
               </a:rPr>
-              <a:t>Features ACID</a:t>
+              <a:t>Incorporating features of ACID</a:t>
             </a:r>
             <a:endParaRPr lang="fa-IR" sz="2400" dirty="0">
               <a:solidFill>
@@ -8117,7 +8080,7 @@
         </p:nvSpPr>
         <p:spPr>
           <a:xfrm>
-            <a:off x="4565863" y="5316526"/>
+            <a:off x="4234470" y="4972858"/>
             <a:ext cx="3543044" cy="1138773"/>
           </a:xfrm>
           <a:prstGeom prst="rect">
@@ -8422,15 +8385,33 @@
                                   </p:childTnLst>
                                 </p:cTn>
                               </p:par>
+                            </p:childTnLst>
+                          </p:cTn>
+                        </p:par>
+                      </p:childTnLst>
+                    </p:cTn>
+                  </p:par>
+                  <p:par>
+                    <p:cTn id="17" fill="hold">
+                      <p:stCondLst>
+                        <p:cond delay="indefinite"/>
+                      </p:stCondLst>
+                      <p:childTnLst>
+                        <p:par>
+                          <p:cTn id="18" fill="hold">
+                            <p:stCondLst>
+                              <p:cond delay="0"/>
+                            </p:stCondLst>
+                            <p:childTnLst>
                               <p:par>
-                                <p:cTn id="17" presetID="1" presetClass="entr" presetSubtype="0" fill="hold" grpId="0" nodeType="withEffect">
+                                <p:cTn id="19" presetID="1" presetClass="entr" presetSubtype="0" fill="hold" grpId="0" nodeType="clickEffect">
                                   <p:stCondLst>
                                     <p:cond delay="0"/>
                                   </p:stCondLst>
                                   <p:childTnLst>
                                     <p:set>
                                       <p:cBhvr>
-                                        <p:cTn id="18" dur="1" fill="hold">
+                                        <p:cTn id="20" dur="1" fill="hold">
                                           <p:stCondLst>
                                             <p:cond delay="0"/>
                                           </p:stCondLst>
@@ -8453,26 +8434,8 @@
                                   </p:childTnLst>
                                 </p:cTn>
                               </p:par>
-                            </p:childTnLst>
-                          </p:cTn>
-                        </p:par>
-                      </p:childTnLst>
-                    </p:cTn>
-                  </p:par>
-                  <p:par>
-                    <p:cTn id="19" fill="hold">
-                      <p:stCondLst>
-                        <p:cond delay="indefinite"/>
-                      </p:stCondLst>
-                      <p:childTnLst>
-                        <p:par>
-                          <p:cTn id="20" fill="hold">
-                            <p:stCondLst>
-                              <p:cond delay="0"/>
-                            </p:stCondLst>
-                            <p:childTnLst>
                               <p:par>
-                                <p:cTn id="21" presetID="1" presetClass="entr" presetSubtype="0" fill="hold" grpId="0" nodeType="clickEffect">
+                                <p:cTn id="21" presetID="1" presetClass="entr" presetSubtype="0" fill="hold" grpId="0" nodeType="withEffect">
                                   <p:stCondLst>
                                     <p:cond delay="0"/>
                                   </p:stCondLst>
@@ -8547,9 +8510,9 @@
                                           </p:stCondLst>
                                         </p:cTn>
                                         <p:tgtEl>
-                                          <p:spTgt spid="3">
+                                          <p:spTgt spid="7">
                                             <p:txEl>
-                                              <p:pRg st="8" end="8"/>
+                                              <p:pRg st="0" end="0"/>
                                             </p:txEl>
                                           </p:spTgt>
                                         </p:tgtEl>
@@ -8573,37 +8536,6 @@
                                     <p:set>
                                       <p:cBhvr>
                                         <p:cTn id="28" dur="1" fill="hold">
-                                          <p:stCondLst>
-                                            <p:cond delay="0"/>
-                                          </p:stCondLst>
-                                        </p:cTn>
-                                        <p:tgtEl>
-                                          <p:spTgt spid="7">
-                                            <p:txEl>
-                                              <p:pRg st="0" end="0"/>
-                                            </p:txEl>
-                                          </p:spTgt>
-                                        </p:tgtEl>
-                                        <p:attrNameLst>
-                                          <p:attrName>style.visibility</p:attrName>
-                                        </p:attrNameLst>
-                                      </p:cBhvr>
-                                      <p:to>
-                                        <p:strVal val="visible"/>
-                                      </p:to>
-                                    </p:set>
-                                  </p:childTnLst>
-                                </p:cTn>
-                              </p:par>
-                              <p:par>
-                                <p:cTn id="29" presetID="1" presetClass="entr" presetSubtype="0" fill="hold" grpId="0" nodeType="withEffect">
-                                  <p:stCondLst>
-                                    <p:cond delay="0"/>
-                                  </p:stCondLst>
-                                  <p:childTnLst>
-                                    <p:set>
-                                      <p:cBhvr>
-                                        <p:cTn id="30" dur="1" fill="hold">
                                           <p:stCondLst>
                                             <p:cond delay="0"/>
                                           </p:stCondLst>
@@ -8748,15 +8680,8 @@
                 <a:latin typeface="Times New Roman" panose="02020603050405020304" pitchFamily="18" charset="0"/>
                 <a:cs typeface="B Nazanin" panose="00000400000000000000" pitchFamily="2" charset="-78"/>
               </a:rPr>
-              <a:t>Queuing and scheduling system tasks</a:t>
-            </a:r>
-            <a:endParaRPr lang="fa-IR" sz="2400" dirty="0">
-              <a:solidFill>
-                <a:schemeClr val="tx1"/>
-              </a:solidFill>
-              <a:latin typeface="Times New Roman" panose="02020603050405020304" pitchFamily="18" charset="0"/>
-              <a:cs typeface="B Nazanin" panose="00000400000000000000" pitchFamily="2" charset="-78"/>
-            </a:endParaRPr>
+              <a:t>Utilizing Redis for queuing and scheduling system tasks</a:t>
+            </a:r>
           </a:p>
           <a:p>
             <a:pPr lvl="1">
@@ -8771,31 +8696,31 @@
                 <a:latin typeface="Times New Roman" panose="02020603050405020304" pitchFamily="18" charset="0"/>
                 <a:cs typeface="B Nazanin" panose="00000400000000000000" pitchFamily="2" charset="-78"/>
               </a:rPr>
-              <a:t>Email service tasks (event-based processes)</a:t>
-            </a:r>
-            <a:endParaRPr lang="fa-IR" sz="2200" dirty="0">
+              <a:t>Handling email service tasks (event-based processes)</a:t>
+            </a:r>
+          </a:p>
+          <a:p>
+            <a:pPr lvl="1">
+              <a:buFont typeface="Courier New" panose="02070309020205020404" pitchFamily="49" charset="0"/>
+              <a:buChar char="o"/>
+            </a:pPr>
+            <a:r>
+              <a:rPr lang="en-US" sz="2200" dirty="0">
+                <a:solidFill>
+                  <a:schemeClr val="tx1"/>
+                </a:solidFill>
+                <a:latin typeface="Times New Roman" panose="02020603050405020304" pitchFamily="18" charset="0"/>
+                <a:cs typeface="B Nazanin" panose="00000400000000000000" pitchFamily="2" charset="-78"/>
+              </a:rPr>
+              <a:t>Managing monthly updates (periodic processing)</a:t>
+            </a:r>
+            <a:endParaRPr lang="en-US" sz="2400" dirty="0">
               <a:solidFill>
                 <a:schemeClr val="tx1"/>
               </a:solidFill>
               <a:latin typeface="Times New Roman" panose="02020603050405020304" pitchFamily="18" charset="0"/>
               <a:cs typeface="B Nazanin" panose="00000400000000000000" pitchFamily="2" charset="-78"/>
             </a:endParaRPr>
-          </a:p>
-          <a:p>
-            <a:pPr lvl="1">
-              <a:buFont typeface="Courier New" panose="02070309020205020404" pitchFamily="49" charset="0"/>
-              <a:buChar char="o"/>
-            </a:pPr>
-            <a:r>
-              <a:rPr lang="en-US" sz="2400" dirty="0">
-                <a:solidFill>
-                  <a:schemeClr val="tx1"/>
-                </a:solidFill>
-                <a:latin typeface="Times New Roman" panose="02020603050405020304" pitchFamily="18" charset="0"/>
-                <a:cs typeface="B Nazanin" panose="00000400000000000000" pitchFamily="2" charset="-78"/>
-              </a:rPr>
-              <a:t>Monthly updates (periodic processing)</a:t>
-            </a:r>
           </a:p>
           <a:p>
             <a:r>
@@ -8829,7 +8754,7 @@
                 <a:latin typeface="Times New Roman" panose="02020603050405020304" pitchFamily="18" charset="0"/>
                 <a:cs typeface="B Nazanin" panose="00000400000000000000" pitchFamily="2" charset="-78"/>
               </a:rPr>
-              <a:t>Support for in-memory and stable storage</a:t>
+              <a:t>Support for both in-memory and stable storage</a:t>
             </a:r>
           </a:p>
           <a:p>
@@ -8845,7 +8770,7 @@
                 <a:latin typeface="Times New Roman" panose="02020603050405020304" pitchFamily="18" charset="0"/>
                 <a:cs typeface="B Nazanin" panose="00000400000000000000" pitchFamily="2" charset="-78"/>
               </a:rPr>
-              <a:t>Three types of queues with different priorities</a:t>
+              <a:t>Provision of three types of queues with varying priorities</a:t>
             </a:r>
             <a:endParaRPr lang="fa-IR" sz="2200" dirty="0">
               <a:solidFill>
@@ -9544,37 +9469,6 @@
                                   </p:childTnLst>
                                 </p:cTn>
                               </p:par>
-                              <p:par>
-                                <p:cTn id="15" presetID="1" presetClass="entr" presetSubtype="0" fill="hold" grpId="0" nodeType="withEffect">
-                                  <p:stCondLst>
-                                    <p:cond delay="0"/>
-                                  </p:stCondLst>
-                                  <p:childTnLst>
-                                    <p:set>
-                                      <p:cBhvr>
-                                        <p:cTn id="16" dur="1" fill="hold">
-                                          <p:stCondLst>
-                                            <p:cond delay="0"/>
-                                          </p:stCondLst>
-                                        </p:cTn>
-                                        <p:tgtEl>
-                                          <p:spTgt spid="3">
-                                            <p:txEl>
-                                              <p:pRg st="4" end="4"/>
-                                            </p:txEl>
-                                          </p:spTgt>
-                                        </p:tgtEl>
-                                        <p:attrNameLst>
-                                          <p:attrName>style.visibility</p:attrName>
-                                        </p:attrNameLst>
-                                      </p:cBhvr>
-                                      <p:to>
-                                        <p:strVal val="visible"/>
-                                      </p:to>
-                                    </p:set>
-                                  </p:childTnLst>
-                                </p:cTn>
-                              </p:par>
                             </p:childTnLst>
                           </p:cTn>
                         </p:par>
@@ -9582,26 +9476,26 @@
                     </p:cTn>
                   </p:par>
                   <p:par>
-                    <p:cTn id="17" fill="hold">
+                    <p:cTn id="15" fill="hold">
                       <p:stCondLst>
                         <p:cond delay="indefinite"/>
                       </p:stCondLst>
                       <p:childTnLst>
                         <p:par>
-                          <p:cTn id="18" fill="hold">
+                          <p:cTn id="16" fill="hold">
                             <p:stCondLst>
                               <p:cond delay="0"/>
                             </p:stCondLst>
                             <p:childTnLst>
                               <p:par>
-                                <p:cTn id="19" presetID="1" presetClass="entr" presetSubtype="0" fill="hold" grpId="0" nodeType="clickEffect">
+                                <p:cTn id="17" presetID="1" presetClass="entr" presetSubtype="0" fill="hold" grpId="0" nodeType="clickEffect">
                                   <p:stCondLst>
                                     <p:cond delay="0"/>
                                   </p:stCondLst>
                                   <p:childTnLst>
                                     <p:set>
                                       <p:cBhvr>
-                                        <p:cTn id="20" dur="1" fill="hold">
+                                        <p:cTn id="18" dur="1" fill="hold">
                                           <p:stCondLst>
                                             <p:cond delay="0"/>
                                           </p:stCondLst>
@@ -9627,19 +9521,46 @@
                     </p:cTn>
                   </p:par>
                   <p:par>
-                    <p:cTn id="21" fill="hold">
+                    <p:cTn id="19" fill="hold">
                       <p:stCondLst>
                         <p:cond delay="indefinite"/>
                       </p:stCondLst>
                       <p:childTnLst>
                         <p:par>
-                          <p:cTn id="22" fill="hold">
+                          <p:cTn id="20" fill="hold">
                             <p:stCondLst>
                               <p:cond delay="0"/>
                             </p:stCondLst>
                             <p:childTnLst>
                               <p:par>
-                                <p:cTn id="23" presetID="1" presetClass="entr" presetSubtype="0" fill="hold" grpId="0" nodeType="clickEffect">
+                                <p:cTn id="21" presetID="1" presetClass="entr" presetSubtype="0" fill="hold" grpId="0" nodeType="clickEffect">
+                                  <p:stCondLst>
+                                    <p:cond delay="0"/>
+                                  </p:stCondLst>
+                                  <p:childTnLst>
+                                    <p:set>
+                                      <p:cBhvr>
+                                        <p:cTn id="22" dur="1" fill="hold">
+                                          <p:stCondLst>
+                                            <p:cond delay="0"/>
+                                          </p:stCondLst>
+                                        </p:cTn>
+                                        <p:tgtEl>
+                                          <p:spTgt spid="9"/>
+                                        </p:tgtEl>
+                                        <p:attrNameLst>
+                                          <p:attrName>style.visibility</p:attrName>
+                                        </p:attrNameLst>
+                                      </p:cBhvr>
+                                      <p:to>
+                                        <p:strVal val="visible"/>
+                                      </p:to>
+                                    </p:set>
+                                  </p:childTnLst>
+                                </p:cTn>
+                              </p:par>
+                              <p:par>
+                                <p:cTn id="23" presetID="1" presetClass="entr" presetSubtype="0" fill="hold" grpId="0" nodeType="withEffect">
                                   <p:stCondLst>
                                     <p:cond delay="0"/>
                                   </p:stCondLst>
@@ -9652,7 +9573,7 @@
                                           </p:stCondLst>
                                         </p:cTn>
                                         <p:tgtEl>
-                                          <p:spTgt spid="9"/>
+                                          <p:spTgt spid="14"/>
                                         </p:tgtEl>
                                         <p:attrNameLst>
                                           <p:attrName>style.visibility</p:attrName>
@@ -9679,33 +9600,6 @@
                                           </p:stCondLst>
                                         </p:cTn>
                                         <p:tgtEl>
-                                          <p:spTgt spid="14"/>
-                                        </p:tgtEl>
-                                        <p:attrNameLst>
-                                          <p:attrName>style.visibility</p:attrName>
-                                        </p:attrNameLst>
-                                      </p:cBhvr>
-                                      <p:to>
-                                        <p:strVal val="visible"/>
-                                      </p:to>
-                                    </p:set>
-                                  </p:childTnLst>
-                                </p:cTn>
-                              </p:par>
-                              <p:par>
-                                <p:cTn id="27" presetID="1" presetClass="entr" presetSubtype="0" fill="hold" grpId="0" nodeType="withEffect">
-                                  <p:stCondLst>
-                                    <p:cond delay="0"/>
-                                  </p:stCondLst>
-                                  <p:childTnLst>
-                                    <p:set>
-                                      <p:cBhvr>
-                                        <p:cTn id="28" dur="1" fill="hold">
-                                          <p:stCondLst>
-                                            <p:cond delay="0"/>
-                                          </p:stCondLst>
-                                        </p:cTn>
-                                        <p:tgtEl>
                                           <p:spTgt spid="25"/>
                                         </p:tgtEl>
                                         <p:attrNameLst>
@@ -9726,19 +9620,46 @@
                     </p:cTn>
                   </p:par>
                   <p:par>
-                    <p:cTn id="29" fill="hold">
+                    <p:cTn id="27" fill="hold">
                       <p:stCondLst>
                         <p:cond delay="indefinite"/>
                       </p:stCondLst>
                       <p:childTnLst>
                         <p:par>
-                          <p:cTn id="30" fill="hold">
+                          <p:cTn id="28" fill="hold">
                             <p:stCondLst>
                               <p:cond delay="0"/>
                             </p:stCondLst>
                             <p:childTnLst>
                               <p:par>
-                                <p:cTn id="31" presetID="1" presetClass="entr" presetSubtype="0" fill="hold" grpId="0" nodeType="clickEffect">
+                                <p:cTn id="29" presetID="1" presetClass="entr" presetSubtype="0" fill="hold" grpId="0" nodeType="clickEffect">
+                                  <p:stCondLst>
+                                    <p:cond delay="0"/>
+                                  </p:stCondLst>
+                                  <p:childTnLst>
+                                    <p:set>
+                                      <p:cBhvr>
+                                        <p:cTn id="30" dur="1" fill="hold">
+                                          <p:stCondLst>
+                                            <p:cond delay="0"/>
+                                          </p:stCondLst>
+                                        </p:cTn>
+                                        <p:tgtEl>
+                                          <p:spTgt spid="18"/>
+                                        </p:tgtEl>
+                                        <p:attrNameLst>
+                                          <p:attrName>style.visibility</p:attrName>
+                                        </p:attrNameLst>
+                                      </p:cBhvr>
+                                      <p:to>
+                                        <p:strVal val="visible"/>
+                                      </p:to>
+                                    </p:set>
+                                  </p:childTnLst>
+                                </p:cTn>
+                              </p:par>
+                              <p:par>
+                                <p:cTn id="31" presetID="1" presetClass="entr" presetSubtype="0" fill="hold" grpId="0" nodeType="withEffect">
                                   <p:stCondLst>
                                     <p:cond delay="0"/>
                                   </p:stCondLst>
@@ -9751,7 +9672,7 @@
                                           </p:stCondLst>
                                         </p:cTn>
                                         <p:tgtEl>
-                                          <p:spTgt spid="18"/>
+                                          <p:spTgt spid="23"/>
                                         </p:tgtEl>
                                         <p:attrNameLst>
                                           <p:attrName>style.visibility</p:attrName>
@@ -9778,33 +9699,6 @@
                                           </p:stCondLst>
                                         </p:cTn>
                                         <p:tgtEl>
-                                          <p:spTgt spid="23"/>
-                                        </p:tgtEl>
-                                        <p:attrNameLst>
-                                          <p:attrName>style.visibility</p:attrName>
-                                        </p:attrNameLst>
-                                      </p:cBhvr>
-                                      <p:to>
-                                        <p:strVal val="visible"/>
-                                      </p:to>
-                                    </p:set>
-                                  </p:childTnLst>
-                                </p:cTn>
-                              </p:par>
-                              <p:par>
-                                <p:cTn id="35" presetID="1" presetClass="entr" presetSubtype="0" fill="hold" grpId="0" nodeType="withEffect">
-                                  <p:stCondLst>
-                                    <p:cond delay="0"/>
-                                  </p:stCondLst>
-                                  <p:childTnLst>
-                                    <p:set>
-                                      <p:cBhvr>
-                                        <p:cTn id="36" dur="1" fill="hold">
-                                          <p:stCondLst>
-                                            <p:cond delay="0"/>
-                                          </p:stCondLst>
-                                        </p:cTn>
-                                        <p:tgtEl>
                                           <p:spTgt spid="27"/>
                                         </p:tgtEl>
                                         <p:attrNameLst>
@@ -9825,19 +9719,46 @@
                     </p:cTn>
                   </p:par>
                   <p:par>
-                    <p:cTn id="37" fill="hold">
+                    <p:cTn id="35" fill="hold">
                       <p:stCondLst>
                         <p:cond delay="indefinite"/>
                       </p:stCondLst>
                       <p:childTnLst>
                         <p:par>
-                          <p:cTn id="38" fill="hold">
+                          <p:cTn id="36" fill="hold">
                             <p:stCondLst>
                               <p:cond delay="0"/>
                             </p:stCondLst>
                             <p:childTnLst>
                               <p:par>
-                                <p:cTn id="39" presetID="1" presetClass="entr" presetSubtype="0" fill="hold" grpId="0" nodeType="clickEffect">
+                                <p:cTn id="37" presetID="1" presetClass="entr" presetSubtype="0" fill="hold" grpId="0" nodeType="clickEffect">
+                                  <p:stCondLst>
+                                    <p:cond delay="0"/>
+                                  </p:stCondLst>
+                                  <p:childTnLst>
+                                    <p:set>
+                                      <p:cBhvr>
+                                        <p:cTn id="38" dur="1" fill="hold">
+                                          <p:stCondLst>
+                                            <p:cond delay="0"/>
+                                          </p:stCondLst>
+                                        </p:cTn>
+                                        <p:tgtEl>
+                                          <p:spTgt spid="15"/>
+                                        </p:tgtEl>
+                                        <p:attrNameLst>
+                                          <p:attrName>style.visibility</p:attrName>
+                                        </p:attrNameLst>
+                                      </p:cBhvr>
+                                      <p:to>
+                                        <p:strVal val="visible"/>
+                                      </p:to>
+                                    </p:set>
+                                  </p:childTnLst>
+                                </p:cTn>
+                              </p:par>
+                              <p:par>
+                                <p:cTn id="39" presetID="1" presetClass="entr" presetSubtype="0" fill="hold" grpId="0" nodeType="withEffect">
                                   <p:stCondLst>
                                     <p:cond delay="0"/>
                                   </p:stCondLst>
@@ -9850,7 +9771,7 @@
                                           </p:stCondLst>
                                         </p:cTn>
                                         <p:tgtEl>
-                                          <p:spTgt spid="15"/>
+                                          <p:spTgt spid="17"/>
                                         </p:tgtEl>
                                         <p:attrNameLst>
                                           <p:attrName>style.visibility</p:attrName>
@@ -9872,33 +9793,6 @@
                                     <p:set>
                                       <p:cBhvr>
                                         <p:cTn id="42" dur="1" fill="hold">
-                                          <p:stCondLst>
-                                            <p:cond delay="0"/>
-                                          </p:stCondLst>
-                                        </p:cTn>
-                                        <p:tgtEl>
-                                          <p:spTgt spid="17"/>
-                                        </p:tgtEl>
-                                        <p:attrNameLst>
-                                          <p:attrName>style.visibility</p:attrName>
-                                        </p:attrNameLst>
-                                      </p:cBhvr>
-                                      <p:to>
-                                        <p:strVal val="visible"/>
-                                      </p:to>
-                                    </p:set>
-                                  </p:childTnLst>
-                                </p:cTn>
-                              </p:par>
-                              <p:par>
-                                <p:cTn id="43" presetID="1" presetClass="entr" presetSubtype="0" fill="hold" grpId="0" nodeType="withEffect">
-                                  <p:stCondLst>
-                                    <p:cond delay="0"/>
-                                  </p:stCondLst>
-                                  <p:childTnLst>
-                                    <p:set>
-                                      <p:cBhvr>
-                                        <p:cTn id="44" dur="1" fill="hold">
                                           <p:stCondLst>
                                             <p:cond delay="0"/>
                                           </p:stCondLst>
@@ -10048,15 +9942,8 @@
                 <a:latin typeface="Times New Roman" panose="02020603050405020304" pitchFamily="18" charset="0"/>
                 <a:cs typeface="B Nazanin" panose="00000400000000000000" pitchFamily="2" charset="-78"/>
               </a:rPr>
-              <a:t>API protocol selection for client and server communication</a:t>
-            </a:r>
-            <a:endParaRPr lang="fa-IR" sz="2400" dirty="0">
-              <a:solidFill>
-                <a:schemeClr val="tx1"/>
-              </a:solidFill>
-              <a:latin typeface="Times New Roman" panose="02020603050405020304" pitchFamily="18" charset="0"/>
-              <a:cs typeface="B Nazanin" panose="00000400000000000000" pitchFamily="2" charset="-78"/>
-            </a:endParaRPr>
+              <a:t>API Protocol Selection for Client and Server Communication</a:t>
+            </a:r>
           </a:p>
           <a:p>
             <a:pPr lvl="1">
@@ -10071,7 +9958,7 @@
                 <a:latin typeface="Times New Roman" panose="02020603050405020304" pitchFamily="18" charset="0"/>
                 <a:cs typeface="B Nazanin" panose="00000400000000000000" pitchFamily="2" charset="-78"/>
               </a:rPr>
-              <a:t>Easier development and maintenance</a:t>
+              <a:t>Aim for easier development and maintenance</a:t>
             </a:r>
           </a:p>
           <a:p>
@@ -10087,7 +9974,7 @@
                 <a:latin typeface="Times New Roman" panose="02020603050405020304" pitchFamily="18" charset="0"/>
                 <a:cs typeface="B Nazanin" panose="00000400000000000000" pitchFamily="2" charset="-78"/>
               </a:rPr>
-              <a:t>Better compatibility with web standards and RDBMS</a:t>
+              <a:t>Ensure better compatibility with web standards and RDBMS</a:t>
             </a:r>
             <a:endParaRPr lang="fa-IR" sz="2800" dirty="0">
               <a:solidFill>
@@ -10111,20 +9998,14 @@
                 <a:latin typeface="Times New Roman" panose="02020603050405020304" pitchFamily="18" charset="0"/>
                 <a:cs typeface="B Nazanin" panose="00000400000000000000" pitchFamily="2" charset="-78"/>
               </a:rPr>
-              <a:t>Choosing a framework for implementing the request handling layer</a:t>
-            </a:r>
-            <a:endParaRPr lang="fa-IR" sz="2400" dirty="0">
-              <a:solidFill>
-                <a:schemeClr val="tx1"/>
-              </a:solidFill>
-              <a:latin typeface="Times New Roman" panose="02020603050405020304" pitchFamily="18" charset="0"/>
-              <a:cs typeface="B Nazanin" panose="00000400000000000000" pitchFamily="2" charset="-78"/>
-            </a:endParaRPr>
+              <a:t>Choosing a Framework for Implementing the Request Handling Layer</a:t>
+            </a:r>
           </a:p>
           <a:p>
             <a:pPr lvl="1">
-              <a:buFont typeface="Courier New" panose="02070309020205020404" pitchFamily="49" charset="0"/>
-              <a:buChar char="o"/>
+              <a:buSzPct val="100000"/>
+              <a:buFont typeface="Arial" panose="020B0604020202020204" pitchFamily="34" charset="0"/>
+              <a:buChar char="•"/>
             </a:pPr>
             <a:r>
               <a:rPr lang="en-US" sz="2200" dirty="0">
@@ -10134,32 +10015,48 @@
                 <a:latin typeface="Times New Roman" panose="02020603050405020304" pitchFamily="18" charset="0"/>
                 <a:cs typeface="B Nazanin" panose="00000400000000000000" pitchFamily="2" charset="-78"/>
               </a:rPr>
-              <a:t>The larger community</a:t>
-            </a:r>
-          </a:p>
-          <a:p>
-            <a:pPr lvl="1">
+              <a:t>Prioritize frameworks with</a:t>
+            </a:r>
+          </a:p>
+          <a:p>
+            <a:pPr lvl="2">
               <a:buFont typeface="Courier New" panose="02070309020205020404" pitchFamily="49" charset="0"/>
               <a:buChar char="o"/>
             </a:pPr>
             <a:r>
-              <a:rPr lang="en-US" sz="2200" dirty="0">
+              <a:rPr lang="en-US" sz="2000" dirty="0">
                 <a:solidFill>
                   <a:schemeClr val="tx1"/>
                 </a:solidFill>
                 <a:latin typeface="Times New Roman" panose="02020603050405020304" pitchFamily="18" charset="0"/>
                 <a:cs typeface="B Nazanin" panose="00000400000000000000" pitchFamily="2" charset="-78"/>
               </a:rPr>
-              <a:t>simple</a:t>
-            </a:r>
-          </a:p>
-          <a:p>
-            <a:pPr lvl="1">
+              <a:t>A larger community</a:t>
+            </a:r>
+          </a:p>
+          <a:p>
+            <a:pPr lvl="2">
               <a:buFont typeface="Courier New" panose="02070309020205020404" pitchFamily="49" charset="0"/>
               <a:buChar char="o"/>
             </a:pPr>
             <a:r>
-              <a:rPr lang="en-US" sz="2200" dirty="0">
+              <a:rPr lang="en-US" sz="2000" dirty="0">
+                <a:solidFill>
+                  <a:schemeClr val="tx1"/>
+                </a:solidFill>
+                <a:latin typeface="Times New Roman" panose="02020603050405020304" pitchFamily="18" charset="0"/>
+                <a:cs typeface="B Nazanin" panose="00000400000000000000" pitchFamily="2" charset="-78"/>
+              </a:rPr>
+              <a:t>Simplicity</a:t>
+            </a:r>
+          </a:p>
+          <a:p>
+            <a:pPr lvl="2">
+              <a:buFont typeface="Courier New" panose="02070309020205020404" pitchFamily="49" charset="0"/>
+              <a:buChar char="o"/>
+            </a:pPr>
+            <a:r>
+              <a:rPr lang="en-US" sz="2000" dirty="0">
                 <a:solidFill>
                   <a:schemeClr val="tx1"/>
                 </a:solidFill>
@@ -10170,12 +10067,12 @@
             </a:r>
           </a:p>
           <a:p>
-            <a:pPr lvl="1">
+            <a:pPr lvl="2">
               <a:buFont typeface="Courier New" panose="02070309020205020404" pitchFamily="49" charset="0"/>
               <a:buChar char="o"/>
             </a:pPr>
             <a:r>
-              <a:rPr lang="en-US" sz="2200" dirty="0">
+              <a:rPr lang="en-US" sz="2000" dirty="0">
                 <a:solidFill>
                   <a:schemeClr val="tx1"/>
                 </a:solidFill>
@@ -10184,7 +10081,7 @@
               </a:rPr>
               <a:t>Firmware support</a:t>
             </a:r>
-            <a:endParaRPr lang="fa-IR" sz="2100" dirty="0">
+            <a:endParaRPr lang="fa-IR" sz="1900" dirty="0">
               <a:solidFill>
                 <a:schemeClr val="tx1"/>
               </a:solidFill>
@@ -10554,37 +10451,6 @@
                                   </p:childTnLst>
                                 </p:cTn>
                               </p:par>
-                              <p:par>
-                                <p:cTn id="19" presetID="1" presetClass="entr" presetSubtype="0" fill="hold" grpId="0" nodeType="withEffect">
-                                  <p:stCondLst>
-                                    <p:cond delay="0"/>
-                                  </p:stCondLst>
-                                  <p:childTnLst>
-                                    <p:set>
-                                      <p:cBhvr>
-                                        <p:cTn id="20" dur="1" fill="hold">
-                                          <p:stCondLst>
-                                            <p:cond delay="0"/>
-                                          </p:stCondLst>
-                                        </p:cTn>
-                                        <p:tgtEl>
-                                          <p:spTgt spid="3">
-                                            <p:txEl>
-                                              <p:pRg st="3" end="3"/>
-                                            </p:txEl>
-                                          </p:spTgt>
-                                        </p:tgtEl>
-                                        <p:attrNameLst>
-                                          <p:attrName>style.visibility</p:attrName>
-                                        </p:attrNameLst>
-                                      </p:cBhvr>
-                                      <p:to>
-                                        <p:strVal val="visible"/>
-                                      </p:to>
-                                    </p:set>
-                                  </p:childTnLst>
-                                </p:cTn>
-                              </p:par>
                             </p:childTnLst>
                           </p:cTn>
                         </p:par>
@@ -10687,14 +10553,18 @@
             <p:ph idx="1"/>
           </p:nvPr>
         </p:nvSpPr>
-        <p:spPr/>
+        <p:spPr>
+          <a:xfrm>
+            <a:off x="1115093" y="1832610"/>
+            <a:ext cx="9872871" cy="4038600"/>
+          </a:xfrm>
+        </p:spPr>
         <p:txBody>
           <a:bodyPr>
             <a:normAutofit/>
           </a:bodyPr>
           <a:lstStyle/>
           <a:p>
-            <a:pPr algn="l"/>
             <a:r>
               <a:rPr lang="en-US" sz="2400" dirty="0">
                 <a:solidFill>
@@ -10703,15 +10573,8 @@
                 <a:latin typeface="Times New Roman" panose="02020603050405020304" pitchFamily="18" charset="0"/>
                 <a:cs typeface="B Nazanin" panose="00000400000000000000" pitchFamily="2" charset="-78"/>
               </a:rPr>
-              <a:t> Password-Based Authentication Systems</a:t>
-            </a:r>
-            <a:endParaRPr lang="fa-IR" sz="2400" dirty="0">
-              <a:solidFill>
-                <a:schemeClr val="tx1"/>
-              </a:solidFill>
-              <a:latin typeface="Times New Roman" panose="02020603050405020304" pitchFamily="18" charset="0"/>
-              <a:cs typeface="B Nazanin" panose="00000400000000000000" pitchFamily="2" charset="-78"/>
-            </a:endParaRPr>
+              <a:t>Implementing Password-Based Authentication Systems</a:t>
+            </a:r>
           </a:p>
           <a:p>
             <a:r>
@@ -10722,7 +10585,7 @@
                 <a:latin typeface="Times New Roman" panose="02020603050405020304" pitchFamily="18" charset="0"/>
                 <a:cs typeface="B Nazanin" panose="00000400000000000000" pitchFamily="2" charset="-78"/>
               </a:rPr>
-              <a:t>Set Password Policies</a:t>
+              <a:t>Setting Password Policies</a:t>
             </a:r>
           </a:p>
           <a:p>
@@ -10734,7 +10597,7 @@
                 <a:latin typeface="Times New Roman" panose="02020603050405020304" pitchFamily="18" charset="0"/>
                 <a:cs typeface="B Nazanin" panose="00000400000000000000" pitchFamily="2" charset="-78"/>
               </a:rPr>
-              <a:t>Using the </a:t>
+              <a:t>Utilizing the </a:t>
             </a:r>
             <a:r>
               <a:rPr lang="en-US" sz="2400" dirty="0" err="1">
@@ -10754,38 +10617,11 @@
                 <a:latin typeface="Times New Roman" panose="02020603050405020304" pitchFamily="18" charset="0"/>
                 <a:cs typeface="B Nazanin" panose="00000400000000000000" pitchFamily="2" charset="-78"/>
               </a:rPr>
-              <a:t> library for </a:t>
-            </a:r>
-            <a:r>
-              <a:rPr lang="en-US" sz="2400" dirty="0" err="1">
-                <a:solidFill>
-                  <a:schemeClr val="tx1"/>
-                </a:solidFill>
-                <a:latin typeface="Times New Roman" panose="02020603050405020304" pitchFamily="18" charset="0"/>
-                <a:cs typeface="B Nazanin" panose="00000400000000000000" pitchFamily="2" charset="-78"/>
-              </a:rPr>
-              <a:t>crypting</a:t>
-            </a:r>
-            <a:r>
-              <a:rPr lang="en-US" sz="2400" dirty="0">
-                <a:solidFill>
-                  <a:schemeClr val="tx1"/>
-                </a:solidFill>
-                <a:latin typeface="Times New Roman" panose="02020603050405020304" pitchFamily="18" charset="0"/>
-                <a:cs typeface="B Nazanin" panose="00000400000000000000" pitchFamily="2" charset="-78"/>
-              </a:rPr>
-              <a:t> the passwords</a:t>
-            </a:r>
-            <a:endParaRPr lang="fa-IR" sz="2400" dirty="0">
-              <a:solidFill>
-                <a:schemeClr val="tx1"/>
-              </a:solidFill>
-              <a:latin typeface="Times New Roman" panose="02020603050405020304" pitchFamily="18" charset="0"/>
-              <a:cs typeface="B Nazanin" panose="00000400000000000000" pitchFamily="2" charset="-78"/>
-            </a:endParaRPr>
-          </a:p>
-          <a:p>
-            <a:pPr lvl="1" algn="l">
+              <a:t> library for password encryption, which includes:</a:t>
+            </a:r>
+          </a:p>
+          <a:p>
+            <a:pPr lvl="1">
               <a:buFont typeface="Courier New" panose="02070309020205020404" pitchFamily="49" charset="0"/>
               <a:buChar char="o"/>
             </a:pPr>
@@ -10799,16 +10635,9 @@
               </a:rPr>
               <a:t>Salting</a:t>
             </a:r>
-            <a:endParaRPr lang="fa-IR" sz="2200" dirty="0">
-              <a:solidFill>
-                <a:schemeClr val="tx1"/>
-              </a:solidFill>
-              <a:latin typeface="Times New Roman" panose="02020603050405020304" pitchFamily="18" charset="0"/>
-              <a:cs typeface="B Nazanin" panose="00000400000000000000" pitchFamily="2" charset="-78"/>
-            </a:endParaRPr>
-          </a:p>
-          <a:p>
-            <a:pPr lvl="1" algn="l">
+          </a:p>
+          <a:p>
+            <a:pPr lvl="1">
               <a:buFont typeface="Courier New" panose="02070309020205020404" pitchFamily="49" charset="0"/>
               <a:buChar char="o"/>
             </a:pPr>
@@ -10822,16 +10651,8 @@
               </a:rPr>
               <a:t>Hashing</a:t>
             </a:r>
-            <a:endParaRPr lang="fa-IR" sz="2200" dirty="0">
-              <a:solidFill>
-                <a:schemeClr val="tx1"/>
-              </a:solidFill>
-              <a:latin typeface="Times New Roman" panose="02020603050405020304" pitchFamily="18" charset="0"/>
-              <a:cs typeface="B Nazanin" panose="00000400000000000000" pitchFamily="2" charset="-78"/>
-            </a:endParaRPr>
-          </a:p>
-          <a:p>
-            <a:pPr algn="l"/>
+          </a:p>
+          <a:p>
             <a:r>
               <a:rPr lang="en-US" sz="2400" dirty="0">
                 <a:solidFill>
@@ -10840,7 +10661,7 @@
                 <a:latin typeface="Times New Roman" panose="02020603050405020304" pitchFamily="18" charset="0"/>
                 <a:cs typeface="B Nazanin" panose="00000400000000000000" pitchFamily="2" charset="-78"/>
               </a:rPr>
-              <a:t>Token-based authentication</a:t>
+              <a:t>Implementing Token-based Authentication</a:t>
             </a:r>
           </a:p>
         </p:txBody>
@@ -11576,26 +11397,39 @@
                                   </p:childTnLst>
                                 </p:cTn>
                               </p:par>
-                            </p:childTnLst>
-                          </p:cTn>
-                        </p:par>
-                      </p:childTnLst>
-                    </p:cTn>
-                  </p:par>
-                  <p:par>
-                    <p:cTn id="15" fill="hold">
-                      <p:stCondLst>
-                        <p:cond delay="indefinite"/>
-                      </p:stCondLst>
-                      <p:childTnLst>
-                        <p:par>
-                          <p:cTn id="16" fill="hold">
-                            <p:stCondLst>
-                              <p:cond delay="0"/>
-                            </p:stCondLst>
-                            <p:childTnLst>
                               <p:par>
-                                <p:cTn id="17" presetID="1" presetClass="entr" presetSubtype="0" fill="hold" grpId="0" nodeType="clickEffect">
+                                <p:cTn id="15" presetID="1" presetClass="entr" presetSubtype="0" fill="hold" grpId="0" nodeType="withEffect">
+                                  <p:stCondLst>
+                                    <p:cond delay="0"/>
+                                  </p:stCondLst>
+                                  <p:childTnLst>
+                                    <p:set>
+                                      <p:cBhvr>
+                                        <p:cTn id="16" dur="1" fill="hold">
+                                          <p:stCondLst>
+                                            <p:cond delay="0"/>
+                                          </p:stCondLst>
+                                        </p:cTn>
+                                        <p:tgtEl>
+                                          <p:spTgt spid="3">
+                                            <p:txEl>
+                                              <p:pRg st="3" end="3"/>
+                                            </p:txEl>
+                                          </p:spTgt>
+                                        </p:tgtEl>
+                                        <p:attrNameLst>
+                                          <p:attrName>style.visibility</p:attrName>
+                                        </p:attrNameLst>
+                                      </p:cBhvr>
+                                      <p:to>
+                                        <p:strVal val="visible"/>
+                                      </p:to>
+                                    </p:set>
+                                  </p:childTnLst>
+                                </p:cTn>
+                              </p:par>
+                              <p:par>
+                                <p:cTn id="17" presetID="1" presetClass="entr" presetSubtype="0" fill="hold" grpId="0" nodeType="withEffect">
                                   <p:stCondLst>
                                     <p:cond delay="0"/>
                                   </p:stCondLst>
@@ -11610,7 +11444,7 @@
                                         <p:tgtEl>
                                           <p:spTgt spid="3">
                                             <p:txEl>
-                                              <p:pRg st="3" end="3"/>
+                                              <p:pRg st="4" end="4"/>
                                             </p:txEl>
                                           </p:spTgt>
                                         </p:tgtEl>
@@ -11659,7 +11493,7 @@
                                         <p:tgtEl>
                                           <p:spTgt spid="3">
                                             <p:txEl>
-                                              <p:pRg st="4" end="4"/>
+                                              <p:pRg st="5" end="5"/>
                                             </p:txEl>
                                           </p:spTgt>
                                         </p:tgtEl>
@@ -12211,7 +12045,6 @@
           </a:bodyPr>
           <a:lstStyle/>
           <a:p>
-            <a:pPr algn="l"/>
             <a:r>
               <a:rPr lang="en-US" sz="2400" dirty="0">
                 <a:solidFill>
@@ -12220,7 +12053,7 @@
                 <a:latin typeface="Times New Roman" panose="02020603050405020304" pitchFamily="18" charset="0"/>
                 <a:cs typeface="B Nazanin" panose="00000400000000000000" pitchFamily="2" charset="-78"/>
               </a:rPr>
-              <a:t>People's financial problems and the need to get loans from banks</a:t>
+              <a:t>Financial challenges faced by individuals and their reliance on bank loans</a:t>
             </a:r>
             <a:endParaRPr lang="fa-IR" sz="2400" dirty="0">
               <a:solidFill>
@@ -12243,15 +12076,8 @@
                 <a:latin typeface="Times New Roman" panose="02020603050405020304" pitchFamily="18" charset="0"/>
                 <a:cs typeface="B Nazanin" panose="00000400000000000000" pitchFamily="2" charset="-78"/>
               </a:rPr>
-              <a:t>Hard conditions to get a loan</a:t>
-            </a:r>
-            <a:endParaRPr lang="fa-IR" sz="2400" dirty="0">
-              <a:solidFill>
-                <a:schemeClr val="tx1"/>
-              </a:solidFill>
-              <a:latin typeface="Times New Roman" panose="02020603050405020304" pitchFamily="18" charset="0"/>
-              <a:cs typeface="B Nazanin" panose="00000400000000000000" pitchFamily="2" charset="-78"/>
-            </a:endParaRPr>
+              <a:t>Stringent loan approval criteria</a:t>
+            </a:r>
           </a:p>
           <a:p>
             <a:pPr lvl="1">
@@ -12266,7 +12092,7 @@
                 <a:latin typeface="Times New Roman" panose="02020603050405020304" pitchFamily="18" charset="0"/>
                 <a:cs typeface="B Nazanin" panose="00000400000000000000" pitchFamily="2" charset="-78"/>
               </a:rPr>
-              <a:t>High interest loans</a:t>
+              <a:t>High-interest rates loans</a:t>
             </a:r>
             <a:endParaRPr lang="fa-IR" sz="2400" dirty="0">
               <a:solidFill>
@@ -12313,15 +12139,8 @@
                 <a:latin typeface="Times New Roman" panose="02020603050405020304" pitchFamily="18" charset="0"/>
                 <a:cs typeface="B Nazanin" panose="00000400000000000000" pitchFamily="2" charset="-78"/>
               </a:rPr>
-              <a:t>Utilization of the traditional and manual method</a:t>
-            </a:r>
-            <a:endParaRPr lang="fa-IR" sz="2400" dirty="0">
-              <a:solidFill>
-                <a:schemeClr val="tx1"/>
-              </a:solidFill>
-              <a:latin typeface="Times New Roman" panose="02020603050405020304" pitchFamily="18" charset="0"/>
-              <a:cs typeface="B Nazanin" panose="00000400000000000000" pitchFamily="2" charset="-78"/>
-            </a:endParaRPr>
+              <a:t>Reliance on traditional and manual methods</a:t>
+            </a:r>
           </a:p>
           <a:p>
             <a:pPr lvl="1">
@@ -12336,15 +12155,8 @@
                 <a:latin typeface="Times New Roman" panose="02020603050405020304" pitchFamily="18" charset="0"/>
                 <a:cs typeface="B Nazanin" panose="00000400000000000000" pitchFamily="2" charset="-78"/>
               </a:rPr>
-              <a:t>Using general accounting software</a:t>
-            </a:r>
-            <a:endParaRPr lang="fa-IR" sz="2400" dirty="0">
-              <a:solidFill>
-                <a:schemeClr val="tx1"/>
-              </a:solidFill>
-              <a:latin typeface="Times New Roman" panose="02020603050405020304" pitchFamily="18" charset="0"/>
-              <a:cs typeface="B Nazanin" panose="00000400000000000000" pitchFamily="2" charset="-78"/>
-            </a:endParaRPr>
+              <a:t>Utilization of general accounting software</a:t>
+            </a:r>
           </a:p>
           <a:p>
             <a:pPr lvl="1">
@@ -12359,7 +12171,7 @@
                 <a:latin typeface="Times New Roman" panose="02020603050405020304" pitchFamily="18" charset="0"/>
                 <a:cs typeface="B Nazanin" panose="00000400000000000000" pitchFamily="2" charset="-78"/>
               </a:rPr>
-              <a:t>Using fund management application</a:t>
+              <a:t>The adoption of a fund management application</a:t>
             </a:r>
             <a:endParaRPr lang="fa-IR" sz="2400" dirty="0">
               <a:solidFill>
@@ -12616,117 +12428,6 @@
                       </p:childTnLst>
                     </p:cTn>
                   </p:par>
-                  <p:par>
-                    <p:cTn id="19" fill="hold">
-                      <p:stCondLst>
-                        <p:cond delay="indefinite"/>
-                      </p:stCondLst>
-                      <p:childTnLst>
-                        <p:par>
-                          <p:cTn id="20" fill="hold">
-                            <p:stCondLst>
-                              <p:cond delay="0"/>
-                            </p:stCondLst>
-                            <p:childTnLst>
-                              <p:par>
-                                <p:cTn id="21" presetID="1" presetClass="entr" presetSubtype="0" fill="hold" grpId="0" nodeType="clickEffect">
-                                  <p:stCondLst>
-                                    <p:cond delay="0"/>
-                                  </p:stCondLst>
-                                  <p:childTnLst>
-                                    <p:set>
-                                      <p:cBhvr>
-                                        <p:cTn id="22" dur="1" fill="hold">
-                                          <p:stCondLst>
-                                            <p:cond delay="0"/>
-                                          </p:stCondLst>
-                                        </p:cTn>
-                                        <p:tgtEl>
-                                          <p:spTgt spid="3">
-                                            <p:txEl>
-                                              <p:pRg st="4" end="4"/>
-                                            </p:txEl>
-                                          </p:spTgt>
-                                        </p:tgtEl>
-                                        <p:attrNameLst>
-                                          <p:attrName>style.visibility</p:attrName>
-                                        </p:attrNameLst>
-                                      </p:cBhvr>
-                                      <p:to>
-                                        <p:strVal val="visible"/>
-                                      </p:to>
-                                    </p:set>
-                                  </p:childTnLst>
-                                </p:cTn>
-                              </p:par>
-                              <p:par>
-                                <p:cTn id="23" presetID="1" presetClass="entr" presetSubtype="0" fill="hold" grpId="0" nodeType="withEffect">
-                                  <p:stCondLst>
-                                    <p:cond delay="0"/>
-                                  </p:stCondLst>
-                                  <p:childTnLst>
-                                    <p:set>
-                                      <p:cBhvr>
-                                        <p:cTn id="24" dur="1" fill="hold">
-                                          <p:stCondLst>
-                                            <p:cond delay="0"/>
-                                          </p:stCondLst>
-                                        </p:cTn>
-                                        <p:tgtEl>
-                                          <p:spTgt spid="3">
-                                            <p:txEl>
-                                              <p:pRg st="5" end="5"/>
-                                            </p:txEl>
-                                          </p:spTgt>
-                                        </p:tgtEl>
-                                        <p:attrNameLst>
-                                          <p:attrName>style.visibility</p:attrName>
-                                        </p:attrNameLst>
-                                      </p:cBhvr>
-                                      <p:to>
-                                        <p:strVal val="visible"/>
-                                      </p:to>
-                                    </p:set>
-                                  </p:childTnLst>
-                                </p:cTn>
-                              </p:par>
-                              <p:par>
-                                <p:cTn id="25" presetID="1" presetClass="entr" presetSubtype="0" fill="hold" grpId="0" nodeType="withEffect">
-                                  <p:stCondLst>
-                                    <p:cond delay="0"/>
-                                  </p:stCondLst>
-                                  <p:childTnLst>
-                                    <p:set>
-                                      <p:cBhvr>
-                                        <p:cTn id="26" dur="1" fill="hold">
-                                          <p:stCondLst>
-                                            <p:cond delay="0"/>
-                                          </p:stCondLst>
-                                        </p:cTn>
-                                        <p:tgtEl>
-                                          <p:spTgt spid="3">
-                                            <p:txEl>
-                                              <p:pRg st="6" end="6"/>
-                                            </p:txEl>
-                                          </p:spTgt>
-                                        </p:tgtEl>
-                                        <p:attrNameLst>
-                                          <p:attrName>style.visibility</p:attrName>
-                                        </p:attrNameLst>
-                                      </p:cBhvr>
-                                      <p:to>
-                                        <p:strVal val="visible"/>
-                                      </p:to>
-                                    </p:set>
-                                  </p:childTnLst>
-                                </p:cTn>
-                              </p:par>
-                            </p:childTnLst>
-                          </p:cTn>
-                        </p:par>
-                      </p:childTnLst>
-                    </p:cTn>
-                  </p:par>
                 </p:childTnLst>
               </p:cTn>
               <p:prevCondLst>
@@ -12990,16 +12691,8 @@
             <a:pPr algn="ctr"/>
             <a:r>
               <a:rPr lang="en-US" sz="2000" dirty="0"/>
-              <a:t>variety of algorithms choice,</a:t>
-            </a:r>
-          </a:p>
-          <a:p>
-            <a:pPr algn="ctr"/>
-            <a:r>
-              <a:rPr lang="en-US" sz="2000" dirty="0"/>
-              <a:t>including some vulnerable algorithms</a:t>
-            </a:r>
-            <a:endParaRPr lang="fa-IR" sz="2000" dirty="0"/>
+              <a:t>Offers a variety of algorithm choices, including some vulnerable ones</a:t>
+            </a:r>
           </a:p>
         </p:txBody>
       </p:sp>
@@ -13034,21 +12727,7 @@
             <a:pPr algn="ctr"/>
             <a:r>
               <a:rPr lang="en-US" sz="2000" dirty="0"/>
-              <a:t>No need to choose an algorithm,</a:t>
-            </a:r>
-          </a:p>
-          <a:p>
-            <a:pPr algn="ctr"/>
-            <a:r>
-              <a:rPr lang="en-US" sz="2000" dirty="0"/>
-              <a:t>has two versions,</a:t>
-            </a:r>
-          </a:p>
-          <a:p>
-            <a:pPr algn="ctr"/>
-            <a:r>
-              <a:rPr lang="en-US" sz="2000" dirty="0"/>
-              <a:t>It has two local and public keys</a:t>
+              <a:t>No need to choose an algorithm, as it has two versions and two sets of keys (local and public)</a:t>
             </a:r>
             <a:endParaRPr lang="fa-IR" sz="2000" dirty="0"/>
           </a:p>
@@ -13159,7 +12838,7 @@
             <a:pPr algn="ctr"/>
             <a:r>
               <a:rPr lang="en-US" sz="2000" dirty="0"/>
-              <a:t>change the </a:t>
+              <a:t>Changing the </a:t>
             </a:r>
             <a:r>
               <a:rPr lang="en-US" sz="2000" dirty="0" err="1"/>
@@ -13167,14 +12846,14 @@
             </a:r>
             <a:r>
               <a:rPr lang="en-US" sz="2000" dirty="0"/>
-              <a:t> to none,</a:t>
+              <a:t> to 'none’,</a:t>
             </a:r>
           </a:p>
           <a:p>
             <a:pPr algn="ctr"/>
             <a:r>
               <a:rPr lang="en-US" sz="2000" dirty="0"/>
-              <a:t>change </a:t>
+              <a:t>Changing </a:t>
             </a:r>
             <a:r>
               <a:rPr lang="en-US" sz="2000" dirty="0" err="1"/>
@@ -13722,18 +13401,11 @@
                 <a:latin typeface="Times New Roman" panose="02020603050405020304" pitchFamily="18" charset="0"/>
                 <a:cs typeface="B Nazanin" panose="00000400000000000000" pitchFamily="2" charset="-78"/>
               </a:rPr>
-              <a:t>Token-based authentication</a:t>
-            </a:r>
-            <a:endParaRPr lang="fa-IR" sz="2400" dirty="0">
-              <a:solidFill>
-                <a:schemeClr val="tx1"/>
-              </a:solidFill>
-              <a:latin typeface="Times New Roman" panose="02020603050405020304" pitchFamily="18" charset="0"/>
-              <a:cs typeface="B Nazanin" panose="00000400000000000000" pitchFamily="2" charset="-78"/>
-            </a:endParaRPr>
-          </a:p>
-          <a:p>
-            <a:pPr lvl="1" algn="l">
+              <a:t>Implementing Token-based authentication with:</a:t>
+            </a:r>
+          </a:p>
+          <a:p>
+            <a:pPr lvl="1">
               <a:buFont typeface="Courier New" panose="02070309020205020404" pitchFamily="49" charset="0"/>
               <a:buChar char="o"/>
             </a:pPr>
@@ -13745,7 +13417,7 @@
                 <a:latin typeface="Times New Roman" panose="02020603050405020304" pitchFamily="18" charset="0"/>
                 <a:cs typeface="B Nazanin" panose="00000400000000000000" pitchFamily="2" charset="-78"/>
               </a:rPr>
-              <a:t>Hashing password</a:t>
+              <a:t>Password hashing</a:t>
             </a:r>
           </a:p>
           <a:p>
@@ -13761,18 +13433,10 @@
                 <a:latin typeface="Times New Roman" panose="02020603050405020304" pitchFamily="18" charset="0"/>
                 <a:cs typeface="B Nazanin" panose="00000400000000000000" pitchFamily="2" charset="-78"/>
               </a:rPr>
-              <a:t>Token expires every 10 minutes</a:t>
-            </a:r>
-            <a:endParaRPr lang="fa-IR" sz="2200" dirty="0">
-              <a:solidFill>
-                <a:schemeClr val="tx1"/>
-              </a:solidFill>
-              <a:latin typeface="Times New Roman" panose="02020603050405020304" pitchFamily="18" charset="0"/>
-              <a:cs typeface="B Nazanin" panose="00000400000000000000" pitchFamily="2" charset="-78"/>
-            </a:endParaRPr>
-          </a:p>
-          <a:p>
-            <a:pPr algn="l"/>
+              <a:t>Tokens expiring every 10 minutes</a:t>
+            </a:r>
+          </a:p>
+          <a:p>
             <a:r>
               <a:rPr lang="en-US" sz="2400" dirty="0">
                 <a:solidFill>
@@ -13781,7 +13445,7 @@
                 <a:latin typeface="Times New Roman" panose="02020603050405020304" pitchFamily="18" charset="0"/>
                 <a:cs typeface="B Nazanin" panose="00000400000000000000" pitchFamily="2" charset="-78"/>
               </a:rPr>
-              <a:t>Session management with refresh tokens</a:t>
+              <a:t>Managing sessions with refresh tokens to:</a:t>
             </a:r>
           </a:p>
           <a:p>
@@ -13797,7 +13461,7 @@
                 <a:latin typeface="Times New Roman" panose="02020603050405020304" pitchFamily="18" charset="0"/>
                 <a:cs typeface="B Nazanin" panose="00000400000000000000" pitchFamily="2" charset="-78"/>
               </a:rPr>
-              <a:t>Refresh access token and maintaining the session despite HTTP statelessness</a:t>
+              <a:t>Refresh access tokens and maintain session despite HTTP statelessness</a:t>
             </a:r>
           </a:p>
           <a:p>
@@ -13813,15 +13477,8 @@
                 <a:latin typeface="Times New Roman" panose="02020603050405020304" pitchFamily="18" charset="0"/>
                 <a:cs typeface="B Nazanin" panose="00000400000000000000" pitchFamily="2" charset="-78"/>
               </a:rPr>
-              <a:t>Token expires every 24 hour</a:t>
-            </a:r>
-            <a:endParaRPr lang="fa-IR" sz="2200" dirty="0">
-              <a:solidFill>
-                <a:schemeClr val="tx1"/>
-              </a:solidFill>
-              <a:latin typeface="Times New Roman" panose="02020603050405020304" pitchFamily="18" charset="0"/>
-              <a:cs typeface="B Nazanin" panose="00000400000000000000" pitchFamily="2" charset="-78"/>
-            </a:endParaRPr>
+              <a:t>Tokens expiring every 24 hours</a:t>
+            </a:r>
           </a:p>
           <a:p>
             <a:r>
@@ -13832,15 +13489,8 @@
                 <a:latin typeface="Times New Roman" panose="02020603050405020304" pitchFamily="18" charset="0"/>
                 <a:cs typeface="B Nazanin" panose="00000400000000000000" pitchFamily="2" charset="-78"/>
               </a:rPr>
-              <a:t> Role-Based Access Control (RBAC)</a:t>
-            </a:r>
-            <a:endParaRPr lang="fa-IR" sz="2400" dirty="0">
-              <a:solidFill>
-                <a:schemeClr val="tx1"/>
-              </a:solidFill>
-              <a:latin typeface="Times New Roman" panose="02020603050405020304" pitchFamily="18" charset="0"/>
-              <a:cs typeface="B Nazanin" panose="00000400000000000000" pitchFamily="2" charset="-78"/>
-            </a:endParaRPr>
+              <a:t>Implementing Role-Based Access Control (RBAC) by:</a:t>
+            </a:r>
           </a:p>
           <a:p>
             <a:pPr lvl="1">
@@ -13855,7 +13505,7 @@
                 <a:latin typeface="Times New Roman" panose="02020603050405020304" pitchFamily="18" charset="0"/>
                 <a:cs typeface="B Nazanin" panose="00000400000000000000" pitchFamily="2" charset="-78"/>
               </a:rPr>
-              <a:t>Defining the three roles of member, family head and manager</a:t>
+              <a:t>Defining three roles: member, family head, and manager</a:t>
             </a:r>
           </a:p>
           <a:p>
@@ -13871,9 +13521,9 @@
                 <a:latin typeface="Times New Roman" panose="02020603050405020304" pitchFamily="18" charset="0"/>
                 <a:cs typeface="B Nazanin" panose="00000400000000000000" pitchFamily="2" charset="-78"/>
               </a:rPr>
-              <a:t>Checking the user's identity with token</a:t>
-            </a:r>
-            <a:endParaRPr lang="fa-IR" sz="2200" dirty="0">
+              <a:t>Verifying user identity with tokens</a:t>
+            </a:r>
+            <a:endParaRPr lang="fa-IR" dirty="0">
               <a:solidFill>
                 <a:schemeClr val="tx1"/>
               </a:solidFill>
@@ -13972,33 +13622,15 @@
                                   </p:childTnLst>
                                 </p:cTn>
                               </p:par>
-                            </p:childTnLst>
-                          </p:cTn>
-                        </p:par>
-                      </p:childTnLst>
-                    </p:cTn>
-                  </p:par>
-                  <p:par>
-                    <p:cTn id="7" fill="hold">
-                      <p:stCondLst>
-                        <p:cond delay="indefinite"/>
-                      </p:stCondLst>
-                      <p:childTnLst>
-                        <p:par>
-                          <p:cTn id="8" fill="hold">
-                            <p:stCondLst>
-                              <p:cond delay="0"/>
-                            </p:stCondLst>
-                            <p:childTnLst>
                               <p:par>
-                                <p:cTn id="9" presetID="1" presetClass="entr" presetSubtype="0" fill="hold" grpId="0" nodeType="clickEffect">
+                                <p:cTn id="7" presetID="1" presetClass="entr" presetSubtype="0" fill="hold" grpId="0" nodeType="withEffect">
                                   <p:stCondLst>
                                     <p:cond delay="0"/>
                                   </p:stCondLst>
                                   <p:childTnLst>
                                     <p:set>
                                       <p:cBhvr>
-                                        <p:cTn id="10" dur="1" fill="hold">
+                                        <p:cTn id="8" dur="1" fill="hold">
                                           <p:stCondLst>
                                             <p:cond delay="0"/>
                                           </p:stCondLst>
@@ -14022,14 +13654,14 @@
                                 </p:cTn>
                               </p:par>
                               <p:par>
-                                <p:cTn id="11" presetID="1" presetClass="entr" presetSubtype="0" fill="hold" grpId="0" nodeType="withEffect">
+                                <p:cTn id="9" presetID="1" presetClass="entr" presetSubtype="0" fill="hold" grpId="0" nodeType="withEffect">
                                   <p:stCondLst>
                                     <p:cond delay="0"/>
                                   </p:stCondLst>
                                   <p:childTnLst>
                                     <p:set>
                                       <p:cBhvr>
-                                        <p:cTn id="12" dur="1" fill="hold">
+                                        <p:cTn id="10" dur="1" fill="hold">
                                           <p:stCondLst>
                                             <p:cond delay="0"/>
                                           </p:stCondLst>
@@ -14059,19 +13691,50 @@
                     </p:cTn>
                   </p:par>
                   <p:par>
-                    <p:cTn id="13" fill="hold">
+                    <p:cTn id="11" fill="hold">
                       <p:stCondLst>
                         <p:cond delay="indefinite"/>
                       </p:stCondLst>
                       <p:childTnLst>
                         <p:par>
-                          <p:cTn id="14" fill="hold">
+                          <p:cTn id="12" fill="hold">
                             <p:stCondLst>
                               <p:cond delay="0"/>
                             </p:stCondLst>
                             <p:childTnLst>
                               <p:par>
-                                <p:cTn id="15" presetID="1" presetClass="entr" presetSubtype="0" fill="hold" grpId="0" nodeType="clickEffect">
+                                <p:cTn id="13" presetID="1" presetClass="entr" presetSubtype="0" fill="hold" grpId="0" nodeType="clickEffect">
+                                  <p:stCondLst>
+                                    <p:cond delay="0"/>
+                                  </p:stCondLst>
+                                  <p:childTnLst>
+                                    <p:set>
+                                      <p:cBhvr>
+                                        <p:cTn id="14" dur="1" fill="hold">
+                                          <p:stCondLst>
+                                            <p:cond delay="0"/>
+                                          </p:stCondLst>
+                                        </p:cTn>
+                                        <p:tgtEl>
+                                          <p:spTgt spid="3">
+                                            <p:txEl>
+                                              <p:pRg st="3" end="3"/>
+                                            </p:txEl>
+                                          </p:spTgt>
+                                        </p:tgtEl>
+                                        <p:attrNameLst>
+                                          <p:attrName>style.visibility</p:attrName>
+                                        </p:attrNameLst>
+                                      </p:cBhvr>
+                                      <p:to>
+                                        <p:strVal val="visible"/>
+                                      </p:to>
+                                    </p:set>
+                                  </p:childTnLst>
+                                </p:cTn>
+                              </p:par>
+                              <p:par>
+                                <p:cTn id="15" presetID="1" presetClass="entr" presetSubtype="0" fill="hold" grpId="0" nodeType="withEffect">
                                   <p:stCondLst>
                                     <p:cond delay="0"/>
                                   </p:stCondLst>
@@ -14086,7 +13749,7 @@
                                         <p:tgtEl>
                                           <p:spTgt spid="3">
                                             <p:txEl>
-                                              <p:pRg st="3" end="3"/>
+                                              <p:pRg st="4" end="4"/>
                                             </p:txEl>
                                           </p:spTgt>
                                         </p:tgtEl>
@@ -14117,37 +13780,6 @@
                                         <p:tgtEl>
                                           <p:spTgt spid="3">
                                             <p:txEl>
-                                              <p:pRg st="4" end="4"/>
-                                            </p:txEl>
-                                          </p:spTgt>
-                                        </p:tgtEl>
-                                        <p:attrNameLst>
-                                          <p:attrName>style.visibility</p:attrName>
-                                        </p:attrNameLst>
-                                      </p:cBhvr>
-                                      <p:to>
-                                        <p:strVal val="visible"/>
-                                      </p:to>
-                                    </p:set>
-                                  </p:childTnLst>
-                                </p:cTn>
-                              </p:par>
-                              <p:par>
-                                <p:cTn id="19" presetID="1" presetClass="entr" presetSubtype="0" fill="hold" grpId="0" nodeType="withEffect">
-                                  <p:stCondLst>
-                                    <p:cond delay="0"/>
-                                  </p:stCondLst>
-                                  <p:childTnLst>
-                                    <p:set>
-                                      <p:cBhvr>
-                                        <p:cTn id="20" dur="1" fill="hold">
-                                          <p:stCondLst>
-                                            <p:cond delay="0"/>
-                                          </p:stCondLst>
-                                        </p:cTn>
-                                        <p:tgtEl>
-                                          <p:spTgt spid="3">
-                                            <p:txEl>
                                               <p:pRg st="5" end="5"/>
                                             </p:txEl>
                                           </p:spTgt>
@@ -14170,19 +13802,50 @@
                     </p:cTn>
                   </p:par>
                   <p:par>
-                    <p:cTn id="21" fill="hold">
+                    <p:cTn id="19" fill="hold">
                       <p:stCondLst>
                         <p:cond delay="indefinite"/>
                       </p:stCondLst>
                       <p:childTnLst>
                         <p:par>
-                          <p:cTn id="22" fill="hold">
+                          <p:cTn id="20" fill="hold">
                             <p:stCondLst>
                               <p:cond delay="0"/>
                             </p:stCondLst>
                             <p:childTnLst>
                               <p:par>
-                                <p:cTn id="23" presetID="1" presetClass="entr" presetSubtype="0" fill="hold" grpId="0" nodeType="clickEffect">
+                                <p:cTn id="21" presetID="1" presetClass="entr" presetSubtype="0" fill="hold" grpId="0" nodeType="clickEffect">
+                                  <p:stCondLst>
+                                    <p:cond delay="0"/>
+                                  </p:stCondLst>
+                                  <p:childTnLst>
+                                    <p:set>
+                                      <p:cBhvr>
+                                        <p:cTn id="22" dur="1" fill="hold">
+                                          <p:stCondLst>
+                                            <p:cond delay="0"/>
+                                          </p:stCondLst>
+                                        </p:cTn>
+                                        <p:tgtEl>
+                                          <p:spTgt spid="3">
+                                            <p:txEl>
+                                              <p:pRg st="6" end="6"/>
+                                            </p:txEl>
+                                          </p:spTgt>
+                                        </p:tgtEl>
+                                        <p:attrNameLst>
+                                          <p:attrName>style.visibility</p:attrName>
+                                        </p:attrNameLst>
+                                      </p:cBhvr>
+                                      <p:to>
+                                        <p:strVal val="visible"/>
+                                      </p:to>
+                                    </p:set>
+                                  </p:childTnLst>
+                                </p:cTn>
+                              </p:par>
+                              <p:par>
+                                <p:cTn id="23" presetID="1" presetClass="entr" presetSubtype="0" fill="hold" grpId="0" nodeType="withEffect">
                                   <p:stCondLst>
                                     <p:cond delay="0"/>
                                   </p:stCondLst>
@@ -14197,7 +13860,38 @@
                                         <p:tgtEl>
                                           <p:spTgt spid="3">
                                             <p:txEl>
-                                              <p:pRg st="6" end="6"/>
+                                              <p:pRg st="7" end="7"/>
+                                            </p:txEl>
+                                          </p:spTgt>
+                                        </p:tgtEl>
+                                        <p:attrNameLst>
+                                          <p:attrName>style.visibility</p:attrName>
+                                        </p:attrNameLst>
+                                      </p:cBhvr>
+                                      <p:to>
+                                        <p:strVal val="visible"/>
+                                      </p:to>
+                                    </p:set>
+                                  </p:childTnLst>
+                                </p:cTn>
+                              </p:par>
+                              <p:par>
+                                <p:cTn id="25" presetID="1" presetClass="entr" presetSubtype="0" fill="hold" grpId="0" nodeType="withEffect">
+                                  <p:stCondLst>
+                                    <p:cond delay="0"/>
+                                  </p:stCondLst>
+                                  <p:childTnLst>
+                                    <p:set>
+                                      <p:cBhvr>
+                                        <p:cTn id="26" dur="1" fill="hold">
+                                          <p:stCondLst>
+                                            <p:cond delay="0"/>
+                                          </p:stCondLst>
+                                        </p:cTn>
+                                        <p:tgtEl>
+                                          <p:spTgt spid="3">
+                                            <p:txEl>
+                                              <p:pRg st="8" end="8"/>
                                             </p:txEl>
                                           </p:spTgt>
                                         </p:tgtEl>
@@ -14339,7 +14033,7 @@
             <a:pPr algn="ctr" rtl="1"/>
             <a:r>
               <a:rPr lang="en-US" dirty="0"/>
-              <a:t>Random data generator functions for database</a:t>
+              <a:t>Utilizing random data generator functions for database</a:t>
             </a:r>
           </a:p>
         </p:txBody>
@@ -15944,7 +15638,6 @@
           </a:bodyPr>
           <a:lstStyle/>
           <a:p>
-            <a:pPr algn="l"/>
             <a:r>
               <a:rPr lang="en-US" sz="2400" dirty="0">
                 <a:solidFill>
@@ -15953,18 +15646,11 @@
                 <a:latin typeface="Times New Roman" panose="02020603050405020304" pitchFamily="18" charset="0"/>
                 <a:cs typeface="B Nazanin" panose="00000400000000000000" pitchFamily="2" charset="-78"/>
               </a:rPr>
-              <a:t>Go Framework test</a:t>
-            </a:r>
-            <a:endParaRPr lang="fa-IR" sz="2400" dirty="0">
-              <a:solidFill>
-                <a:schemeClr val="tx1"/>
-              </a:solidFill>
-              <a:latin typeface="Times New Roman" panose="02020603050405020304" pitchFamily="18" charset="0"/>
-              <a:cs typeface="B Nazanin" panose="00000400000000000000" pitchFamily="2" charset="-78"/>
-            </a:endParaRPr>
-          </a:p>
-          <a:p>
-            <a:pPr lvl="1" algn="l">
+              <a:t>Utilizing the Go Framework for unit testing</a:t>
+            </a:r>
+          </a:p>
+          <a:p>
+            <a:pPr lvl="1">
               <a:buFont typeface="Courier New" panose="02070309020205020404" pitchFamily="49" charset="0"/>
               <a:buChar char="o"/>
             </a:pPr>
@@ -15976,11 +15662,11 @@
                 <a:latin typeface="Times New Roman" panose="02020603050405020304" pitchFamily="18" charset="0"/>
                 <a:cs typeface="B Nazanin" panose="00000400000000000000" pitchFamily="2" charset="-78"/>
               </a:rPr>
-              <a:t>Unit Test</a:t>
-            </a:r>
-          </a:p>
-          <a:p>
-            <a:pPr lvl="1" algn="l">
+              <a:t>Performing Unit Tests</a:t>
+            </a:r>
+          </a:p>
+          <a:p>
+            <a:pPr lvl="1">
               <a:buFont typeface="Courier New" panose="02070309020205020404" pitchFamily="49" charset="0"/>
               <a:buChar char="o"/>
             </a:pPr>
@@ -15992,15 +15678,8 @@
                 <a:latin typeface="Times New Roman" panose="02020603050405020304" pitchFamily="18" charset="0"/>
                 <a:cs typeface="B Nazanin" panose="00000400000000000000" pitchFamily="2" charset="-78"/>
               </a:rPr>
-              <a:t>Test Case</a:t>
-            </a:r>
-            <a:endParaRPr lang="fa-IR" sz="2200" dirty="0">
-              <a:solidFill>
-                <a:schemeClr val="tx1"/>
-              </a:solidFill>
-              <a:latin typeface="Times New Roman" panose="02020603050405020304" pitchFamily="18" charset="0"/>
-              <a:cs typeface="B Nazanin" panose="00000400000000000000" pitchFamily="2" charset="-78"/>
-            </a:endParaRPr>
+              <a:t>Defining Test Cases</a:t>
+            </a:r>
           </a:p>
           <a:p>
             <a:r>
@@ -16023,15 +15702,8 @@
                 <a:latin typeface="Times New Roman" panose="02020603050405020304" pitchFamily="18" charset="0"/>
                 <a:cs typeface="B Nazanin" panose="00000400000000000000" pitchFamily="2" charset="-78"/>
               </a:rPr>
-              <a:t>Test results</a:t>
-            </a:r>
-            <a:endParaRPr lang="fa-IR" sz="2400" dirty="0">
-              <a:solidFill>
-                <a:schemeClr val="tx1"/>
-              </a:solidFill>
-              <a:latin typeface="Times New Roman" panose="02020603050405020304" pitchFamily="18" charset="0"/>
-              <a:cs typeface="B Nazanin" panose="00000400000000000000" pitchFamily="2" charset="-78"/>
-            </a:endParaRPr>
+              <a:t>Test Results</a:t>
+            </a:r>
           </a:p>
           <a:p>
             <a:pPr lvl="1">
@@ -16046,7 +15718,7 @@
                 <a:latin typeface="Times New Roman" panose="02020603050405020304" pitchFamily="18" charset="0"/>
                 <a:cs typeface="B Nazanin" panose="00000400000000000000" pitchFamily="2" charset="-78"/>
               </a:rPr>
-              <a:t>81% coverage of the program by unit tests</a:t>
+              <a:t>Achieving 81% coverage of the program by unit tests</a:t>
             </a:r>
           </a:p>
           <a:p>
@@ -16062,9 +15734,9 @@
                 <a:latin typeface="Times New Roman" panose="02020603050405020304" pitchFamily="18" charset="0"/>
                 <a:cs typeface="B Nazanin" panose="00000400000000000000" pitchFamily="2" charset="-78"/>
               </a:rPr>
-              <a:t>Coverage of the rest with test cases</a:t>
-            </a:r>
-            <a:endParaRPr lang="fa-IR" sz="2200" dirty="0">
+              <a:t>Covering the remaining aspects with test cases</a:t>
+            </a:r>
+            <a:endParaRPr lang="fa-IR" dirty="0">
               <a:solidFill>
                 <a:schemeClr val="tx1"/>
               </a:solidFill>
@@ -16323,33 +15995,15 @@
                                   </p:childTnLst>
                                 </p:cTn>
                               </p:par>
-                            </p:childTnLst>
-                          </p:cTn>
-                        </p:par>
-                      </p:childTnLst>
-                    </p:cTn>
-                  </p:par>
-                  <p:par>
-                    <p:cTn id="19" fill="hold">
-                      <p:stCondLst>
-                        <p:cond delay="indefinite"/>
-                      </p:stCondLst>
-                      <p:childTnLst>
-                        <p:par>
-                          <p:cTn id="20" fill="hold">
-                            <p:stCondLst>
-                              <p:cond delay="0"/>
-                            </p:stCondLst>
-                            <p:childTnLst>
                               <p:par>
-                                <p:cTn id="21" presetID="1" presetClass="entr" presetSubtype="0" fill="hold" grpId="0" nodeType="clickEffect">
+                                <p:cTn id="19" presetID="1" presetClass="entr" presetSubtype="0" fill="hold" grpId="0" nodeType="withEffect">
                                   <p:stCondLst>
                                     <p:cond delay="0"/>
                                   </p:stCondLst>
                                   <p:childTnLst>
                                     <p:set>
                                       <p:cBhvr>
-                                        <p:cTn id="22" dur="1" fill="hold">
+                                        <p:cTn id="20" dur="1" fill="hold">
                                           <p:stCondLst>
                                             <p:cond delay="0"/>
                                           </p:stCondLst>
@@ -16372,33 +16026,15 @@
                                   </p:childTnLst>
                                 </p:cTn>
                               </p:par>
-                            </p:childTnLst>
-                          </p:cTn>
-                        </p:par>
-                      </p:childTnLst>
-                    </p:cTn>
-                  </p:par>
-                  <p:par>
-                    <p:cTn id="23" fill="hold">
-                      <p:stCondLst>
-                        <p:cond delay="indefinite"/>
-                      </p:stCondLst>
-                      <p:childTnLst>
-                        <p:par>
-                          <p:cTn id="24" fill="hold">
-                            <p:stCondLst>
-                              <p:cond delay="0"/>
-                            </p:stCondLst>
-                            <p:childTnLst>
                               <p:par>
-                                <p:cTn id="25" presetID="1" presetClass="entr" presetSubtype="0" fill="hold" grpId="0" nodeType="clickEffect">
+                                <p:cTn id="21" presetID="1" presetClass="entr" presetSubtype="0" fill="hold" grpId="0" nodeType="withEffect">
                                   <p:stCondLst>
                                     <p:cond delay="0"/>
                                   </p:stCondLst>
                                   <p:childTnLst>
                                     <p:set>
                                       <p:cBhvr>
-                                        <p:cTn id="26" dur="1" fill="hold">
+                                        <p:cTn id="22" dur="1" fill="hold">
                                           <p:stCondLst>
                                             <p:cond delay="0"/>
                                           </p:stCondLst>
@@ -16565,7 +16201,39 @@
                 <a:latin typeface="Times New Roman" panose="02020603050405020304" pitchFamily="18" charset="0"/>
                 <a:cs typeface="B Nazanin" panose="00000400000000000000" pitchFamily="2" charset="-78"/>
               </a:rPr>
-              <a:t>Preventing abuse and possible monopolies in system management</a:t>
+              <a:t>Prevent abuse and potential monopolies in system management</a:t>
+            </a:r>
+          </a:p>
+          <a:p>
+            <a:pPr lvl="1">
+              <a:buFont typeface="Courier New" panose="02070309020205020404" pitchFamily="49" charset="0"/>
+              <a:buChar char="o"/>
+            </a:pPr>
+            <a:r>
+              <a:rPr lang="en-US" sz="2400" dirty="0">
+                <a:solidFill>
+                  <a:schemeClr val="tx1"/>
+                </a:solidFill>
+                <a:latin typeface="Times New Roman" panose="02020603050405020304" pitchFamily="18" charset="0"/>
+                <a:cs typeface="B Nazanin" panose="00000400000000000000" pitchFamily="2" charset="-78"/>
+              </a:rPr>
+              <a:t>Monitor the actions of the fund manager closely</a:t>
+            </a:r>
+          </a:p>
+          <a:p>
+            <a:pPr lvl="1">
+              <a:buFont typeface="Courier New" panose="02070309020205020404" pitchFamily="49" charset="0"/>
+              <a:buChar char="o"/>
+            </a:pPr>
+            <a:r>
+              <a:rPr lang="en-US" sz="2400" dirty="0">
+                <a:solidFill>
+                  <a:schemeClr val="tx1"/>
+                </a:solidFill>
+                <a:latin typeface="Times New Roman" panose="02020603050405020304" pitchFamily="18" charset="0"/>
+                <a:cs typeface="B Nazanin" panose="00000400000000000000" pitchFamily="2" charset="-78"/>
+              </a:rPr>
+              <a:t>Require approval for decisions related to the manager’s personal interests</a:t>
             </a:r>
             <a:endParaRPr lang="fa-IR" sz="2400" dirty="0">
               <a:solidFill>
@@ -16576,6 +16244,25 @@
             </a:endParaRPr>
           </a:p>
           <a:p>
+            <a:r>
+              <a:rPr lang="en-US" sz="2600" dirty="0">
+                <a:solidFill>
+                  <a:schemeClr val="tx1"/>
+                </a:solidFill>
+                <a:latin typeface="Times New Roman" panose="02020603050405020304" pitchFamily="18" charset="0"/>
+                <a:cs typeface="B Nazanin" panose="00000400000000000000" pitchFamily="2" charset="-78"/>
+              </a:rPr>
+              <a:t>Diversifying loan options</a:t>
+            </a:r>
+            <a:endParaRPr lang="fa-IR" sz="2600" dirty="0">
+              <a:solidFill>
+                <a:schemeClr val="tx1"/>
+              </a:solidFill>
+              <a:latin typeface="Times New Roman" panose="02020603050405020304" pitchFamily="18" charset="0"/>
+              <a:cs typeface="B Nazanin" panose="00000400000000000000" pitchFamily="2" charset="-78"/>
+            </a:endParaRPr>
+          </a:p>
+          <a:p>
             <a:pPr lvl="1">
               <a:buFont typeface="Courier New" panose="02070309020205020404" pitchFamily="49" charset="0"/>
               <a:buChar char="o"/>
@@ -16588,7 +16275,7 @@
                 <a:latin typeface="Times New Roman" panose="02020603050405020304" pitchFamily="18" charset="0"/>
                 <a:cs typeface="B Nazanin" panose="00000400000000000000" pitchFamily="2" charset="-78"/>
               </a:rPr>
-              <a:t>Close monitoring of the actions of the fund manager</a:t>
+              <a:t>Offering additional loans such as essential, student, and marriage loans</a:t>
             </a:r>
           </a:p>
           <a:p>
@@ -16604,7 +16291,23 @@
                 <a:latin typeface="Times New Roman" panose="02020603050405020304" pitchFamily="18" charset="0"/>
                 <a:cs typeface="B Nazanin" panose="00000400000000000000" pitchFamily="2" charset="-78"/>
               </a:rPr>
-              <a:t>Providing approval for decisions related to the manager’s personal interests</a:t>
+              <a:t>Requiring approval from the manager</a:t>
+            </a:r>
+          </a:p>
+          <a:p>
+            <a:pPr lvl="1">
+              <a:buFont typeface="Courier New" panose="02070309020205020404" pitchFamily="49" charset="0"/>
+              <a:buChar char="o"/>
+            </a:pPr>
+            <a:r>
+              <a:rPr lang="en-US" sz="2400" dirty="0">
+                <a:solidFill>
+                  <a:schemeClr val="tx1"/>
+                </a:solidFill>
+                <a:latin typeface="Times New Roman" panose="02020603050405020304" pitchFamily="18" charset="0"/>
+                <a:cs typeface="B Nazanin" panose="00000400000000000000" pitchFamily="2" charset="-78"/>
+              </a:rPr>
+              <a:t>Promoting greater flexibility and financial support for members</a:t>
             </a:r>
             <a:endParaRPr lang="fa-IR" sz="2400" dirty="0">
               <a:solidFill>
@@ -16623,15 +16326,8 @@
                 <a:latin typeface="Times New Roman" panose="02020603050405020304" pitchFamily="18" charset="0"/>
                 <a:cs typeface="B Nazanin" panose="00000400000000000000" pitchFamily="2" charset="-78"/>
               </a:rPr>
-              <a:t>Diversify loan options</a:t>
-            </a:r>
-            <a:endParaRPr lang="fa-IR" sz="2600" dirty="0">
-              <a:solidFill>
-                <a:schemeClr val="tx1"/>
-              </a:solidFill>
-              <a:latin typeface="Times New Roman" panose="02020603050405020304" pitchFamily="18" charset="0"/>
-              <a:cs typeface="B Nazanin" panose="00000400000000000000" pitchFamily="2" charset="-78"/>
-            </a:endParaRPr>
+              <a:t>Managing multiple independent funds simultaneously</a:t>
+            </a:r>
           </a:p>
           <a:p>
             <a:pPr lvl="1">
@@ -16646,7 +16342,7 @@
                 <a:latin typeface="Times New Roman" panose="02020603050405020304" pitchFamily="18" charset="0"/>
                 <a:cs typeface="B Nazanin" panose="00000400000000000000" pitchFamily="2" charset="-78"/>
               </a:rPr>
-              <a:t>Providing additional loans, such as essential, student, and marriage loans</a:t>
+              <a:t>Creating and managing several independent savings funds within a single system</a:t>
             </a:r>
           </a:p>
           <a:p>
@@ -16662,81 +16358,7 @@
                 <a:latin typeface="Times New Roman" panose="02020603050405020304" pitchFamily="18" charset="0"/>
                 <a:cs typeface="B Nazanin" panose="00000400000000000000" pitchFamily="2" charset="-78"/>
               </a:rPr>
-              <a:t>Requires approval from the manager</a:t>
-            </a:r>
-          </a:p>
-          <a:p>
-            <a:pPr lvl="1">
-              <a:buFont typeface="Courier New" panose="02070309020205020404" pitchFamily="49" charset="0"/>
-              <a:buChar char="o"/>
-            </a:pPr>
-            <a:r>
-              <a:rPr lang="en-US" sz="2400" dirty="0">
-                <a:solidFill>
-                  <a:schemeClr val="tx1"/>
-                </a:solidFill>
-                <a:latin typeface="Times New Roman" panose="02020603050405020304" pitchFamily="18" charset="0"/>
-                <a:cs typeface="B Nazanin" panose="00000400000000000000" pitchFamily="2" charset="-78"/>
-              </a:rPr>
-              <a:t>Promote greater flexibility and financial support for members</a:t>
-            </a:r>
-            <a:endParaRPr lang="fa-IR" sz="2400" dirty="0">
-              <a:solidFill>
-                <a:schemeClr val="tx1"/>
-              </a:solidFill>
-              <a:latin typeface="Times New Roman" panose="02020603050405020304" pitchFamily="18" charset="0"/>
-              <a:cs typeface="B Nazanin" panose="00000400000000000000" pitchFamily="2" charset="-78"/>
-            </a:endParaRPr>
-          </a:p>
-          <a:p>
-            <a:r>
-              <a:rPr lang="en-US" sz="2600" dirty="0">
-                <a:solidFill>
-                  <a:schemeClr val="tx1"/>
-                </a:solidFill>
-                <a:latin typeface="Times New Roman" panose="02020603050405020304" pitchFamily="18" charset="0"/>
-                <a:cs typeface="B Nazanin" panose="00000400000000000000" pitchFamily="2" charset="-78"/>
-              </a:rPr>
-              <a:t>Managing multiple independent funds at the same time</a:t>
-            </a:r>
-            <a:endParaRPr lang="fa-IR" sz="2600" dirty="0">
-              <a:solidFill>
-                <a:schemeClr val="tx1"/>
-              </a:solidFill>
-              <a:latin typeface="Times New Roman" panose="02020603050405020304" pitchFamily="18" charset="0"/>
-              <a:cs typeface="B Nazanin" panose="00000400000000000000" pitchFamily="2" charset="-78"/>
-            </a:endParaRPr>
-          </a:p>
-          <a:p>
-            <a:pPr lvl="1">
-              <a:buFont typeface="Courier New" panose="02070309020205020404" pitchFamily="49" charset="0"/>
-              <a:buChar char="o"/>
-            </a:pPr>
-            <a:r>
-              <a:rPr lang="en-US" sz="2400" dirty="0">
-                <a:solidFill>
-                  <a:schemeClr val="tx1"/>
-                </a:solidFill>
-                <a:latin typeface="Times New Roman" panose="02020603050405020304" pitchFamily="18" charset="0"/>
-                <a:cs typeface="B Nazanin" panose="00000400000000000000" pitchFamily="2" charset="-78"/>
-              </a:rPr>
-              <a:t>Creating and managing several independent savings funds in a single system</a:t>
-            </a:r>
-          </a:p>
-          <a:p>
-            <a:pPr lvl="1">
-              <a:buFont typeface="Courier New" panose="02070309020205020404" pitchFamily="49" charset="0"/>
-              <a:buChar char="o"/>
-            </a:pPr>
-            <a:r>
-              <a:rPr lang="en-US" sz="2400" dirty="0">
-                <a:solidFill>
-                  <a:schemeClr val="tx1"/>
-                </a:solidFill>
-                <a:latin typeface="Times New Roman" panose="02020603050405020304" pitchFamily="18" charset="0"/>
-                <a:cs typeface="B Nazanin" panose="00000400000000000000" pitchFamily="2" charset="-78"/>
-              </a:rPr>
-              <a:t>Commercial expansion of the system</a:t>
+              <a:t>Facilitating commercial expansion of the system</a:t>
             </a:r>
             <a:endParaRPr lang="fa-IR" sz="2400" dirty="0">
               <a:solidFill>
@@ -17058,55 +16680,6 @@
                                           <p:spTgt spid="3">
                                             <p:txEl>
                                               <p:pRg st="7" end="7"/>
-                                            </p:txEl>
-                                          </p:spTgt>
-                                        </p:tgtEl>
-                                        <p:attrNameLst>
-                                          <p:attrName>style.visibility</p:attrName>
-                                        </p:attrNameLst>
-                                      </p:cBhvr>
-                                      <p:to>
-                                        <p:strVal val="visible"/>
-                                      </p:to>
-                                    </p:set>
-                                  </p:childTnLst>
-                                </p:cTn>
-                              </p:par>
-                            </p:childTnLst>
-                          </p:cTn>
-                        </p:par>
-                      </p:childTnLst>
-                    </p:cTn>
-                  </p:par>
-                  <p:par>
-                    <p:cTn id="23" fill="hold">
-                      <p:stCondLst>
-                        <p:cond delay="indefinite"/>
-                      </p:stCondLst>
-                      <p:childTnLst>
-                        <p:par>
-                          <p:cTn id="24" fill="hold">
-                            <p:stCondLst>
-                              <p:cond delay="0"/>
-                            </p:stCondLst>
-                            <p:childTnLst>
-                              <p:par>
-                                <p:cTn id="25" presetID="1" presetClass="entr" presetSubtype="0" fill="hold" grpId="0" nodeType="clickEffect">
-                                  <p:stCondLst>
-                                    <p:cond delay="0"/>
-                                  </p:stCondLst>
-                                  <p:childTnLst>
-                                    <p:set>
-                                      <p:cBhvr>
-                                        <p:cTn id="26" dur="1" fill="hold">
-                                          <p:stCondLst>
-                                            <p:cond delay="0"/>
-                                          </p:stCondLst>
-                                        </p:cTn>
-                                        <p:tgtEl>
-                                          <p:spTgt spid="3">
-                                            <p:txEl>
-                                              <p:pRg st="8" end="8"/>
                                             </p:txEl>
                                           </p:spTgt>
                                         </p:tgtEl>
@@ -18860,7 +18433,7 @@
                 <a:latin typeface="Times New Roman" panose="02020603050405020304" pitchFamily="18" charset="0"/>
                 <a:cs typeface="B Nazanin" panose="00000400000000000000" pitchFamily="2" charset="-78"/>
               </a:rPr>
-              <a:t>Traditional Methods’ Administrative Part’s Weaknesses</a:t>
+              <a:t>Weaknesses in Traditional Administration Methods</a:t>
             </a:r>
           </a:p>
         </p:txBody>
@@ -18888,7 +18461,6 @@
           </a:bodyPr>
           <a:lstStyle/>
           <a:p>
-            <a:pPr algn="l"/>
             <a:r>
               <a:rPr lang="en-US" sz="2400" dirty="0">
                 <a:solidFill>
@@ -18897,15 +18469,8 @@
                 <a:latin typeface="Times New Roman" panose="02020603050405020304" pitchFamily="18" charset="0"/>
                 <a:cs typeface="B Nazanin" panose="00000400000000000000" pitchFamily="2" charset="-78"/>
               </a:rPr>
-              <a:t>Possible calculation errors caused by the accountant</a:t>
-            </a:r>
-            <a:endParaRPr lang="fa-IR" sz="2400" dirty="0">
-              <a:solidFill>
-                <a:schemeClr val="tx1"/>
-              </a:solidFill>
-              <a:latin typeface="Times New Roman" panose="02020603050405020304" pitchFamily="18" charset="0"/>
-              <a:cs typeface="B Nazanin" panose="00000400000000000000" pitchFamily="2" charset="-78"/>
-            </a:endParaRPr>
+              <a:t>Potential calculation errors caused by accountants</a:t>
+            </a:r>
           </a:p>
           <a:p>
             <a:r>
@@ -18916,7 +18481,7 @@
                 <a:latin typeface="Times New Roman" panose="02020603050405020304" pitchFamily="18" charset="0"/>
                 <a:cs typeface="B Nazanin" panose="00000400000000000000" pitchFamily="2" charset="-78"/>
               </a:rPr>
-              <a:t>Spending a lot of time monthly doing audits by the accountant</a:t>
+              <a:t>Significant monthly time spent on audits by accountants</a:t>
             </a:r>
           </a:p>
           <a:p>
@@ -18928,15 +18493,8 @@
                 <a:latin typeface="Times New Roman" panose="02020603050405020304" pitchFamily="18" charset="0"/>
                 <a:cs typeface="B Nazanin" panose="00000400000000000000" pitchFamily="2" charset="-78"/>
               </a:rPr>
-              <a:t>Absence of a follow-up mechanism for members' payments</a:t>
-            </a:r>
-            <a:endParaRPr lang="fa-IR" sz="2400" dirty="0">
-              <a:solidFill>
-                <a:schemeClr val="tx1"/>
-              </a:solidFill>
-              <a:latin typeface="Times New Roman" panose="02020603050405020304" pitchFamily="18" charset="0"/>
-              <a:cs typeface="B Nazanin" panose="00000400000000000000" pitchFamily="2" charset="-78"/>
-            </a:endParaRPr>
+              <a:t>Lack of a follow-up mechanism for members' payments</a:t>
+            </a:r>
           </a:p>
           <a:p>
             <a:r>
@@ -18947,15 +18505,8 @@
                 <a:latin typeface="Times New Roman" panose="02020603050405020304" pitchFamily="18" charset="0"/>
                 <a:cs typeface="B Nazanin" panose="00000400000000000000" pitchFamily="2" charset="-78"/>
               </a:rPr>
-              <a:t>Spending a lot of time monthly recording members' payments</a:t>
-            </a:r>
-            <a:endParaRPr lang="fa-IR" sz="2400" dirty="0">
-              <a:solidFill>
-                <a:schemeClr val="tx1"/>
-              </a:solidFill>
-              <a:latin typeface="Times New Roman" panose="02020603050405020304" pitchFamily="18" charset="0"/>
-              <a:cs typeface="B Nazanin" panose="00000400000000000000" pitchFamily="2" charset="-78"/>
-            </a:endParaRPr>
+              <a:t>Time-consuming monthly recording of members' payments</a:t>
+            </a:r>
           </a:p>
           <a:p>
             <a:r>
@@ -18966,25 +18517,8 @@
                 <a:latin typeface="Times New Roman" panose="02020603050405020304" pitchFamily="18" charset="0"/>
                 <a:cs typeface="B Nazanin" panose="00000400000000000000" pitchFamily="2" charset="-78"/>
               </a:rPr>
-              <a:t>Manual calculation of the loan allocation plan for future period</a:t>
-            </a:r>
-            <a:endParaRPr lang="fa-IR" sz="2400" dirty="0">
-              <a:solidFill>
-                <a:schemeClr val="tx1"/>
-              </a:solidFill>
-              <a:latin typeface="Times New Roman" panose="02020603050405020304" pitchFamily="18" charset="0"/>
-              <a:cs typeface="B Nazanin" panose="00000400000000000000" pitchFamily="2" charset="-78"/>
-            </a:endParaRPr>
-          </a:p>
-          <a:p>
-            <a:pPr algn="l"/>
-            <a:endParaRPr lang="fa-IR" sz="2400" dirty="0">
-              <a:solidFill>
-                <a:schemeClr val="tx1"/>
-              </a:solidFill>
-              <a:latin typeface="Times New Roman" panose="02020603050405020304" pitchFamily="18" charset="0"/>
-              <a:cs typeface="B Nazanin" panose="00000400000000000000" pitchFamily="2" charset="-78"/>
-            </a:endParaRPr>
+              <a:t>Manual calculation of loan allocation plans for future periods</a:t>
+            </a:r>
           </a:p>
         </p:txBody>
       </p:sp>
@@ -19080,33 +18614,15 @@
                                   </p:childTnLst>
                                 </p:cTn>
                               </p:par>
-                            </p:childTnLst>
-                          </p:cTn>
-                        </p:par>
-                      </p:childTnLst>
-                    </p:cTn>
-                  </p:par>
-                  <p:par>
-                    <p:cTn id="7" fill="hold">
-                      <p:stCondLst>
-                        <p:cond delay="indefinite"/>
-                      </p:stCondLst>
-                      <p:childTnLst>
-                        <p:par>
-                          <p:cTn id="8" fill="hold">
-                            <p:stCondLst>
-                              <p:cond delay="0"/>
-                            </p:stCondLst>
-                            <p:childTnLst>
                               <p:par>
-                                <p:cTn id="9" presetID="1" presetClass="entr" presetSubtype="0" fill="hold" grpId="0" nodeType="clickEffect">
+                                <p:cTn id="7" presetID="1" presetClass="entr" presetSubtype="0" fill="hold" grpId="0" nodeType="withEffect">
                                   <p:stCondLst>
                                     <p:cond delay="0"/>
                                   </p:stCondLst>
                                   <p:childTnLst>
                                     <p:set>
                                       <p:cBhvr>
-                                        <p:cTn id="10" dur="1" fill="hold">
+                                        <p:cTn id="8" dur="1" fill="hold">
                                           <p:stCondLst>
                                             <p:cond delay="0"/>
                                           </p:stCondLst>
@@ -19129,33 +18645,15 @@
                                   </p:childTnLst>
                                 </p:cTn>
                               </p:par>
-                            </p:childTnLst>
-                          </p:cTn>
-                        </p:par>
-                      </p:childTnLst>
-                    </p:cTn>
-                  </p:par>
-                  <p:par>
-                    <p:cTn id="11" fill="hold">
-                      <p:stCondLst>
-                        <p:cond delay="indefinite"/>
-                      </p:stCondLst>
-                      <p:childTnLst>
-                        <p:par>
-                          <p:cTn id="12" fill="hold">
-                            <p:stCondLst>
-                              <p:cond delay="0"/>
-                            </p:stCondLst>
-                            <p:childTnLst>
                               <p:par>
-                                <p:cTn id="13" presetID="1" presetClass="entr" presetSubtype="0" fill="hold" grpId="0" nodeType="clickEffect">
+                                <p:cTn id="9" presetID="1" presetClass="entr" presetSubtype="0" fill="hold" grpId="0" nodeType="withEffect">
                                   <p:stCondLst>
                                     <p:cond delay="0"/>
                                   </p:stCondLst>
                                   <p:childTnLst>
                                     <p:set>
                                       <p:cBhvr>
-                                        <p:cTn id="14" dur="1" fill="hold">
+                                        <p:cTn id="10" dur="1" fill="hold">
                                           <p:stCondLst>
                                             <p:cond delay="0"/>
                                           </p:stCondLst>
@@ -19179,14 +18677,14 @@
                                 </p:cTn>
                               </p:par>
                               <p:par>
-                                <p:cTn id="15" presetID="1" presetClass="entr" presetSubtype="0" fill="hold" grpId="0" nodeType="withEffect">
+                                <p:cTn id="11" presetID="1" presetClass="entr" presetSubtype="0" fill="hold" grpId="0" nodeType="withEffect">
                                   <p:stCondLst>
                                     <p:cond delay="0"/>
                                   </p:stCondLst>
                                   <p:childTnLst>
                                     <p:set>
                                       <p:cBhvr>
-                                        <p:cTn id="16" dur="1" fill="hold">
+                                        <p:cTn id="12" dur="1" fill="hold">
                                           <p:stCondLst>
                                             <p:cond delay="0"/>
                                           </p:stCondLst>
@@ -19195,6 +18693,37 @@
                                           <p:spTgt spid="3">
                                             <p:txEl>
                                               <p:pRg st="3" end="3"/>
+                                            </p:txEl>
+                                          </p:spTgt>
+                                        </p:tgtEl>
+                                        <p:attrNameLst>
+                                          <p:attrName>style.visibility</p:attrName>
+                                        </p:attrNameLst>
+                                      </p:cBhvr>
+                                      <p:to>
+                                        <p:strVal val="visible"/>
+                                      </p:to>
+                                    </p:set>
+                                  </p:childTnLst>
+                                </p:cTn>
+                              </p:par>
+                              <p:par>
+                                <p:cTn id="13" presetID="1" presetClass="entr" presetSubtype="0" fill="hold" grpId="0" nodeType="withEffect">
+                                  <p:stCondLst>
+                                    <p:cond delay="0"/>
+                                  </p:stCondLst>
+                                  <p:childTnLst>
+                                    <p:set>
+                                      <p:cBhvr>
+                                        <p:cTn id="14" dur="1" fill="hold">
+                                          <p:stCondLst>
+                                            <p:cond delay="0"/>
+                                          </p:stCondLst>
+                                        </p:cTn>
+                                        <p:tgtEl>
+                                          <p:spTgt spid="3">
+                                            <p:txEl>
+                                              <p:pRg st="4" end="4"/>
                                             </p:txEl>
                                           </p:spTgt>
                                         </p:tgtEl>
@@ -19279,7 +18808,7 @@
         <p:spPr>
           <a:xfrm>
             <a:off x="1142999" y="609600"/>
-            <a:ext cx="9983223" cy="1356360"/>
+            <a:ext cx="8541049" cy="1356360"/>
           </a:xfrm>
         </p:spPr>
         <p:txBody>
@@ -19294,7 +18823,7 @@
                 <a:latin typeface="Times New Roman" panose="02020603050405020304" pitchFamily="18" charset="0"/>
                 <a:cs typeface="B Nazanin" panose="00000400000000000000" pitchFamily="2" charset="-78"/>
               </a:rPr>
-              <a:t>General Applications’ Administrative Part’s Weaknesses</a:t>
+              <a:t>Drawbacks in the Administrative Experience of General Applications</a:t>
             </a:r>
           </a:p>
         </p:txBody>
@@ -19335,7 +18864,7 @@
                 <a:latin typeface="Times New Roman" panose="02020603050405020304" pitchFamily="18" charset="0"/>
                 <a:cs typeface="B Nazanin" panose="00000400000000000000" pitchFamily="2" charset="-78"/>
               </a:rPr>
-              <a:t>Possible calculation errors caused by the accountant</a:t>
+              <a:t>Potential calculation errors caused by accountants</a:t>
             </a:r>
           </a:p>
           <a:p>
@@ -19347,7 +18876,7 @@
                 <a:latin typeface="Times New Roman" panose="02020603050405020304" pitchFamily="18" charset="0"/>
                 <a:cs typeface="B Nazanin" panose="00000400000000000000" pitchFamily="2" charset="-78"/>
               </a:rPr>
-              <a:t>Spending a lot of time monthly doing audits by the accountant</a:t>
+              <a:t>Significant monthly time spent on audits by accountants</a:t>
             </a:r>
           </a:p>
           <a:p>
@@ -19359,7 +18888,7 @@
                 <a:latin typeface="Times New Roman" panose="02020603050405020304" pitchFamily="18" charset="0"/>
                 <a:cs typeface="B Nazanin" panose="00000400000000000000" pitchFamily="2" charset="-78"/>
               </a:rPr>
-              <a:t>Absence of a follow-up mechanism for members' payments</a:t>
+              <a:t>Lack of a follow-up mechanism for members' payments</a:t>
             </a:r>
           </a:p>
           <a:p>
@@ -19371,7 +18900,7 @@
                 <a:latin typeface="Times New Roman" panose="02020603050405020304" pitchFamily="18" charset="0"/>
                 <a:cs typeface="B Nazanin" panose="00000400000000000000" pitchFamily="2" charset="-78"/>
               </a:rPr>
-              <a:t>Spending a lot of time monthly recording members' payments</a:t>
+              <a:t>Time-consuming monthly recording of members' payments</a:t>
             </a:r>
           </a:p>
           <a:p>
@@ -19383,7 +18912,7 @@
                 <a:latin typeface="Times New Roman" panose="02020603050405020304" pitchFamily="18" charset="0"/>
                 <a:cs typeface="B Nazanin" panose="00000400000000000000" pitchFamily="2" charset="-78"/>
               </a:rPr>
-              <a:t>Manual calculation of the loan allocation plan for future period</a:t>
+              <a:t>Manual calculation of loan allocation plans for future periods</a:t>
             </a:r>
           </a:p>
           <a:p>
@@ -19395,7 +18924,7 @@
                 <a:latin typeface="Times New Roman" panose="02020603050405020304" pitchFamily="18" charset="0"/>
                 <a:cs typeface="B Nazanin" panose="00000400000000000000" pitchFamily="2" charset="-78"/>
               </a:rPr>
-              <a:t>Having many tools not useful for savings funds</a:t>
+              <a:t>Inclusion of unnecessary tools irrelevant to savings funds</a:t>
             </a:r>
           </a:p>
           <a:p>
@@ -19407,7 +18936,7 @@
                 <a:latin typeface="Times New Roman" panose="02020603050405020304" pitchFamily="18" charset="0"/>
                 <a:cs typeface="B Nazanin" panose="00000400000000000000" pitchFamily="2" charset="-78"/>
               </a:rPr>
-              <a:t>Software complexity and Hard to use for regular users</a:t>
+              <a:t>Software complexity and difficulty of use for regular users</a:t>
             </a:r>
             <a:endParaRPr lang="fa-IR" sz="2400" dirty="0">
               <a:solidFill>
@@ -19853,33 +19382,15 @@
                                   </p:childTnLst>
                                 </p:cTn>
                               </p:par>
-                            </p:childTnLst>
-                          </p:cTn>
-                        </p:par>
-                      </p:childTnLst>
-                    </p:cTn>
-                  </p:par>
-                  <p:par>
-                    <p:cTn id="21" fill="hold">
-                      <p:stCondLst>
-                        <p:cond delay="indefinite"/>
-                      </p:stCondLst>
-                      <p:childTnLst>
-                        <p:par>
-                          <p:cTn id="22" fill="hold">
-                            <p:stCondLst>
-                              <p:cond delay="0"/>
-                            </p:stCondLst>
-                            <p:childTnLst>
                               <p:par>
-                                <p:cTn id="23" presetID="1" presetClass="entr" presetSubtype="0" fill="hold" grpId="0" nodeType="clickEffect">
+                                <p:cTn id="21" presetID="1" presetClass="entr" presetSubtype="0" fill="hold" grpId="0" nodeType="withEffect">
                                   <p:stCondLst>
                                     <p:cond delay="0"/>
                                   </p:stCondLst>
                                   <p:childTnLst>
                                     <p:set>
                                       <p:cBhvr>
-                                        <p:cTn id="24" dur="1" fill="hold">
+                                        <p:cTn id="22" dur="1" fill="hold">
                                           <p:stCondLst>
                                             <p:cond delay="0"/>
                                           </p:stCondLst>
@@ -19888,37 +19399,6 @@
                                           <p:spTgt spid="3">
                                             <p:txEl>
                                               <p:pRg st="4" end="4"/>
-                                            </p:txEl>
-                                          </p:spTgt>
-                                        </p:tgtEl>
-                                        <p:attrNameLst>
-                                          <p:attrName>style.visibility</p:attrName>
-                                        </p:attrNameLst>
-                                      </p:cBhvr>
-                                      <p:to>
-                                        <p:strVal val="visible"/>
-                                      </p:to>
-                                    </p:set>
-                                  </p:childTnLst>
-                                </p:cTn>
-                              </p:par>
-                              <p:par>
-                                <p:cTn id="25" presetID="1" presetClass="entr" presetSubtype="0" fill="hold" grpId="0" nodeType="withEffect">
-                                  <p:stCondLst>
-                                    <p:cond delay="0"/>
-                                  </p:stCondLst>
-                                  <p:childTnLst>
-                                    <p:set>
-                                      <p:cBhvr>
-                                        <p:cTn id="26" dur="1" fill="hold">
-                                          <p:stCondLst>
-                                            <p:cond delay="0"/>
-                                          </p:stCondLst>
-                                        </p:cTn>
-                                        <p:tgtEl>
-                                          <p:spTgt spid="3">
-                                            <p:txEl>
-                                              <p:pRg st="5" end="5"/>
                                             </p:txEl>
                                           </p:spTgt>
                                         </p:tgtEl>
@@ -20000,7 +19480,12 @@
             <p:ph type="title"/>
           </p:nvPr>
         </p:nvSpPr>
-        <p:spPr/>
+        <p:spPr>
+          <a:xfrm>
+            <a:off x="1143000" y="609600"/>
+            <a:ext cx="8571733" cy="1356360"/>
+          </a:xfrm>
+        </p:spPr>
         <p:txBody>
           <a:bodyPr>
             <a:normAutofit/>
@@ -20013,21 +19498,7 @@
                 <a:latin typeface="Times New Roman" panose="02020603050405020304" pitchFamily="18" charset="0"/>
                 <a:cs typeface="B Nazanin" panose="00000400000000000000" pitchFamily="2" charset="-78"/>
               </a:rPr>
-              <a:t>Fund Management </a:t>
-            </a:r>
-            <a:r>
-              <a:rPr lang="en-US" sz="3200" b="1" dirty="0" err="1">
-                <a:latin typeface="Times New Roman" panose="02020603050405020304" pitchFamily="18" charset="0"/>
-                <a:cs typeface="B Nazanin" panose="00000400000000000000" pitchFamily="2" charset="-78"/>
-              </a:rPr>
-              <a:t>Softwares</a:t>
-            </a:r>
-            <a:r>
-              <a:rPr lang="en-US" sz="3200" b="1" dirty="0">
-                <a:latin typeface="Times New Roman" panose="02020603050405020304" pitchFamily="18" charset="0"/>
-                <a:cs typeface="B Nazanin" panose="00000400000000000000" pitchFamily="2" charset="-78"/>
-              </a:rPr>
-              <a:t>’ Administrative Part’s Weaknesses</a:t>
+              <a:t>Drawbacks in the Administrative Experience of Fund Management Applications</a:t>
             </a:r>
           </a:p>
         </p:txBody>
@@ -20068,7 +19539,7 @@
                 <a:latin typeface="Times New Roman" panose="02020603050405020304" pitchFamily="18" charset="0"/>
                 <a:cs typeface="B Nazanin" panose="00000400000000000000" pitchFamily="2" charset="-78"/>
               </a:rPr>
-              <a:t>Possible calculation errors caused by the accountant</a:t>
+              <a:t>Potential calculation errors caused by accountants</a:t>
             </a:r>
           </a:p>
           <a:p>
@@ -20080,7 +19551,7 @@
                 <a:latin typeface="Times New Roman" panose="02020603050405020304" pitchFamily="18" charset="0"/>
                 <a:cs typeface="B Nazanin" panose="00000400000000000000" pitchFamily="2" charset="-78"/>
               </a:rPr>
-              <a:t>Spending a lot of time monthly doing audits by the accountant</a:t>
+              <a:t>Significant monthly time spent on audits by accountants</a:t>
             </a:r>
           </a:p>
           <a:p>
@@ -20092,7 +19563,7 @@
                 <a:latin typeface="Times New Roman" panose="02020603050405020304" pitchFamily="18" charset="0"/>
                 <a:cs typeface="B Nazanin" panose="00000400000000000000" pitchFamily="2" charset="-78"/>
               </a:rPr>
-              <a:t>Absence of a follow-up mechanism for members' payments</a:t>
+              <a:t>Lack of a follow-up mechanism for members' payments</a:t>
             </a:r>
           </a:p>
           <a:p>
@@ -20104,7 +19575,7 @@
                 <a:latin typeface="Times New Roman" panose="02020603050405020304" pitchFamily="18" charset="0"/>
                 <a:cs typeface="B Nazanin" panose="00000400000000000000" pitchFamily="2" charset="-78"/>
               </a:rPr>
-              <a:t>Spending a lot of time monthly recording members' payments</a:t>
+              <a:t>Time-consuming monthly recording of members' payments</a:t>
             </a:r>
           </a:p>
           <a:p>
@@ -20116,7 +19587,7 @@
                 <a:latin typeface="Times New Roman" panose="02020603050405020304" pitchFamily="18" charset="0"/>
                 <a:cs typeface="B Nazanin" panose="00000400000000000000" pitchFamily="2" charset="-78"/>
               </a:rPr>
-              <a:t>Manual calculation of the loan allocation plan for future period</a:t>
+              <a:t>Manual calculation of loan allocation plans for future periods</a:t>
             </a:r>
           </a:p>
           <a:p>
@@ -20128,7 +19599,7 @@
                 <a:latin typeface="Times New Roman" panose="02020603050405020304" pitchFamily="18" charset="0"/>
                 <a:cs typeface="B Nazanin" panose="00000400000000000000" pitchFamily="2" charset="-78"/>
               </a:rPr>
-              <a:t>Having many tools not useful for savings funds</a:t>
+              <a:t>Inclusion of unnecessary tools irrelevant to savings funds</a:t>
             </a:r>
           </a:p>
           <a:p>
@@ -20140,7 +19611,7 @@
                 <a:latin typeface="Times New Roman" panose="02020603050405020304" pitchFamily="18" charset="0"/>
                 <a:cs typeface="B Nazanin" panose="00000400000000000000" pitchFamily="2" charset="-78"/>
               </a:rPr>
-              <a:t>Software complexity and Hard to use for regular users</a:t>
+              <a:t>Software complexity and difficulty of use for regular users</a:t>
             </a:r>
           </a:p>
         </p:txBody>
@@ -20484,37 +19955,6 @@
                                   </p:childTnLst>
                                 </p:cTn>
                               </p:par>
-                              <p:par>
-                                <p:cTn id="19" presetID="1" presetClass="entr" presetSubtype="0" fill="hold" grpId="0" nodeType="withEffect">
-                                  <p:stCondLst>
-                                    <p:cond delay="0"/>
-                                  </p:stCondLst>
-                                  <p:childTnLst>
-                                    <p:set>
-                                      <p:cBhvr>
-                                        <p:cTn id="20" dur="1" fill="hold">
-                                          <p:stCondLst>
-                                            <p:cond delay="0"/>
-                                          </p:stCondLst>
-                                        </p:cTn>
-                                        <p:tgtEl>
-                                          <p:spTgt spid="8">
-                                            <p:txEl>
-                                              <p:pRg st="5" end="5"/>
-                                            </p:txEl>
-                                          </p:spTgt>
-                                        </p:tgtEl>
-                                        <p:attrNameLst>
-                                          <p:attrName>style.visibility</p:attrName>
-                                        </p:attrNameLst>
-                                      </p:cBhvr>
-                                      <p:to>
-                                        <p:strVal val="visible"/>
-                                      </p:to>
-                                    </p:set>
-                                  </p:childTnLst>
-                                </p:cTn>
-                              </p:par>
                             </p:childTnLst>
                           </p:cTn>
                         </p:par>
@@ -20584,8 +20024,8 @@
         </p:nvSpPr>
         <p:spPr>
           <a:xfrm>
-            <a:off x="1142999" y="609600"/>
-            <a:ext cx="10038456" cy="1356360"/>
+            <a:off x="1142998" y="609600"/>
+            <a:ext cx="9811391" cy="1356360"/>
           </a:xfrm>
         </p:spPr>
         <p:txBody>
@@ -20600,7 +20040,7 @@
                 <a:latin typeface="Times New Roman" panose="02020603050405020304" pitchFamily="18" charset="0"/>
                 <a:cs typeface="B Nazanin" panose="00000400000000000000" pitchFamily="2" charset="-78"/>
               </a:rPr>
-              <a:t>The Solution for Administrative Part (Project’s Purpose)</a:t>
+              <a:t>The Solution to Administrative Experience Drawbacks (Project’s Purpose)</a:t>
             </a:r>
           </a:p>
         </p:txBody>
@@ -20623,7 +20063,7 @@
         </p:nvSpPr>
         <p:spPr>
           <a:xfrm>
-            <a:off x="1143000" y="2057400"/>
+            <a:off x="1162876" y="2057400"/>
             <a:ext cx="9872871" cy="4073376"/>
           </a:xfrm>
         </p:spPr>
@@ -20641,7 +20081,7 @@
                 <a:latin typeface="Times New Roman" panose="02020603050405020304" pitchFamily="18" charset="0"/>
                 <a:cs typeface="B Nazanin" panose="00000400000000000000" pitchFamily="2" charset="-78"/>
               </a:rPr>
-              <a:t>Simplicity, user-friendly, and easy and convenient use​</a:t>
+              <a:t>Simplicity, user-friendliness, and ease of use</a:t>
             </a:r>
           </a:p>
           <a:p>
@@ -20653,7 +20093,7 @@
                 <a:latin typeface="Times New Roman" panose="02020603050405020304" pitchFamily="18" charset="0"/>
                 <a:cs typeface="B Nazanin" panose="00000400000000000000" pitchFamily="2" charset="-78"/>
               </a:rPr>
-              <a:t>Automating accounting and cashiering responsibilities and eliminating their human factor</a:t>
+              <a:t>Automation of accounting and cashiering tasks to eliminate human errors</a:t>
             </a:r>
           </a:p>
           <a:p>
@@ -20665,7 +20105,7 @@
                 <a:latin typeface="Times New Roman" panose="02020603050405020304" pitchFamily="18" charset="0"/>
                 <a:cs typeface="B Nazanin" panose="00000400000000000000" pitchFamily="2" charset="-78"/>
               </a:rPr>
-              <a:t>Automating the tracking, payment and registration of members' debts</a:t>
+              <a:t>Automation of tracking, payment, and registration of members' debts</a:t>
             </a:r>
           </a:p>
           <a:p>
@@ -20677,7 +20117,7 @@
                 <a:latin typeface="Times New Roman" panose="02020603050405020304" pitchFamily="18" charset="0"/>
                 <a:cs typeface="B Nazanin" panose="00000400000000000000" pitchFamily="2" charset="-78"/>
               </a:rPr>
-              <a:t>Automating recording accounts and conducting member audits</a:t>
+              <a:t>Automation of account recording and member audits</a:t>
             </a:r>
           </a:p>
           <a:p>
@@ -20689,7 +20129,7 @@
                 <a:latin typeface="Times New Roman" panose="02020603050405020304" pitchFamily="18" charset="0"/>
                 <a:cs typeface="B Nazanin" panose="00000400000000000000" pitchFamily="2" charset="-78"/>
               </a:rPr>
-              <a:t>Automating the loan allocation planning for the future period</a:t>
+              <a:t>Automation of loan allocation planning for future periods</a:t>
             </a:r>
             <a:endParaRPr lang="fa-IR" sz="2400" dirty="0">
               <a:solidFill>
@@ -20839,15 +20279,33 @@
                                   </p:childTnLst>
                                 </p:cTn>
                               </p:par>
+                            </p:childTnLst>
+                          </p:cTn>
+                        </p:par>
+                      </p:childTnLst>
+                    </p:cTn>
+                  </p:par>
+                  <p:par>
+                    <p:cTn id="11" fill="hold">
+                      <p:stCondLst>
+                        <p:cond delay="indefinite"/>
+                      </p:stCondLst>
+                      <p:childTnLst>
+                        <p:par>
+                          <p:cTn id="12" fill="hold">
+                            <p:stCondLst>
+                              <p:cond delay="0"/>
+                            </p:stCondLst>
+                            <p:childTnLst>
                               <p:par>
-                                <p:cTn id="11" presetID="1" presetClass="entr" presetSubtype="0" fill="hold" grpId="0" nodeType="withEffect">
+                                <p:cTn id="13" presetID="1" presetClass="entr" presetSubtype="0" fill="hold" grpId="0" nodeType="clickEffect">
                                   <p:stCondLst>
                                     <p:cond delay="0"/>
                                   </p:stCondLst>
                                   <p:childTnLst>
                                     <p:set>
                                       <p:cBhvr>
-                                        <p:cTn id="12" dur="1" fill="hold">
+                                        <p:cTn id="14" dur="1" fill="hold">
                                           <p:stCondLst>
                                             <p:cond delay="0"/>
                                           </p:stCondLst>
@@ -20877,26 +20335,26 @@
                     </p:cTn>
                   </p:par>
                   <p:par>
-                    <p:cTn id="13" fill="hold">
+                    <p:cTn id="15" fill="hold">
                       <p:stCondLst>
                         <p:cond delay="indefinite"/>
                       </p:stCondLst>
                       <p:childTnLst>
                         <p:par>
-                          <p:cTn id="14" fill="hold">
+                          <p:cTn id="16" fill="hold">
                             <p:stCondLst>
                               <p:cond delay="0"/>
                             </p:stCondLst>
                             <p:childTnLst>
                               <p:par>
-                                <p:cTn id="15" presetID="1" presetClass="entr" presetSubtype="0" fill="hold" grpId="0" nodeType="clickEffect">
+                                <p:cTn id="17" presetID="1" presetClass="entr" presetSubtype="0" fill="hold" grpId="0" nodeType="clickEffect">
                                   <p:stCondLst>
                                     <p:cond delay="0"/>
                                   </p:stCondLst>
                                   <p:childTnLst>
                                     <p:set>
                                       <p:cBhvr>
-                                        <p:cTn id="16" dur="1" fill="hold">
+                                        <p:cTn id="18" dur="1" fill="hold">
                                           <p:stCondLst>
                                             <p:cond delay="0"/>
                                           </p:stCondLst>
@@ -20905,6 +20363,55 @@
                                           <p:spTgt spid="5">
                                             <p:txEl>
                                               <p:pRg st="3" end="3"/>
+                                            </p:txEl>
+                                          </p:spTgt>
+                                        </p:tgtEl>
+                                        <p:attrNameLst>
+                                          <p:attrName>style.visibility</p:attrName>
+                                        </p:attrNameLst>
+                                      </p:cBhvr>
+                                      <p:to>
+                                        <p:strVal val="visible"/>
+                                      </p:to>
+                                    </p:set>
+                                  </p:childTnLst>
+                                </p:cTn>
+                              </p:par>
+                            </p:childTnLst>
+                          </p:cTn>
+                        </p:par>
+                      </p:childTnLst>
+                    </p:cTn>
+                  </p:par>
+                  <p:par>
+                    <p:cTn id="19" fill="hold">
+                      <p:stCondLst>
+                        <p:cond delay="indefinite"/>
+                      </p:stCondLst>
+                      <p:childTnLst>
+                        <p:par>
+                          <p:cTn id="20" fill="hold">
+                            <p:stCondLst>
+                              <p:cond delay="0"/>
+                            </p:stCondLst>
+                            <p:childTnLst>
+                              <p:par>
+                                <p:cTn id="21" presetID="1" presetClass="entr" presetSubtype="0" fill="hold" grpId="0" nodeType="clickEffect">
+                                  <p:stCondLst>
+                                    <p:cond delay="0"/>
+                                  </p:stCondLst>
+                                  <p:childTnLst>
+                                    <p:set>
+                                      <p:cBhvr>
+                                        <p:cTn id="22" dur="1" fill="hold">
+                                          <p:stCondLst>
+                                            <p:cond delay="0"/>
+                                          </p:stCondLst>
+                                        </p:cTn>
+                                        <p:tgtEl>
+                                          <p:spTgt spid="5">
+                                            <p:txEl>
+                                              <p:pRg st="4" end="4"/>
                                             </p:txEl>
                                           </p:spTgt>
                                         </p:tgtEl>
@@ -20999,7 +20506,7 @@
                 <a:latin typeface="Times New Roman" panose="02020603050405020304" pitchFamily="18" charset="0"/>
                 <a:cs typeface="B Nazanin" panose="00000400000000000000" pitchFamily="2" charset="-78"/>
               </a:rPr>
-              <a:t>Existing Software's User Part's Weaknesses</a:t>
+              <a:t>Drawbacks in User Experience of Existing Software</a:t>
             </a:r>
           </a:p>
         </p:txBody>
@@ -21035,7 +20542,7 @@
                 <a:latin typeface="Times New Roman" panose="02020603050405020304" pitchFamily="18" charset="0"/>
                 <a:cs typeface="B Nazanin" panose="00000400000000000000" pitchFamily="2" charset="-78"/>
               </a:rPr>
-              <a:t>No Information for members about the loan’s receiving date and its amount</a:t>
+              <a:t>Absence of information on loan disbursement dates and amounts for members</a:t>
             </a:r>
           </a:p>
           <a:p>
@@ -21047,7 +20554,7 @@
                 <a:latin typeface="Times New Roman" panose="02020603050405020304" pitchFamily="18" charset="0"/>
                 <a:cs typeface="B Nazanin" panose="00000400000000000000" pitchFamily="2" charset="-78"/>
               </a:rPr>
-              <a:t>No Information for members about their accounts and debts</a:t>
+              <a:t>Lack of member visibility into their accounts and debts</a:t>
             </a:r>
           </a:p>
           <a:p>
@@ -21059,15 +20566,8 @@
                 <a:latin typeface="Times New Roman" panose="02020603050405020304" pitchFamily="18" charset="0"/>
                 <a:cs typeface="B Nazanin" panose="00000400000000000000" pitchFamily="2" charset="-78"/>
               </a:rPr>
-              <a:t>No definition for family head or manager</a:t>
-            </a:r>
-            <a:endParaRPr lang="fa-IR" sz="2400" dirty="0">
-              <a:solidFill>
-                <a:schemeClr val="tx1"/>
-              </a:solidFill>
-              <a:latin typeface="Times New Roman" panose="02020603050405020304" pitchFamily="18" charset="0"/>
-              <a:cs typeface="B Nazanin" panose="00000400000000000000" pitchFamily="2" charset="-78"/>
-            </a:endParaRPr>
+              <a:t>Missing functionality to define family heads or managers</a:t>
+            </a:r>
           </a:p>
           <a:p>
             <a:r>
@@ -21078,7 +20578,7 @@
                 <a:latin typeface="Times New Roman" panose="02020603050405020304" pitchFamily="18" charset="0"/>
                 <a:cs typeface="B Nazanin" panose="00000400000000000000" pitchFamily="2" charset="-78"/>
               </a:rPr>
-              <a:t>No possibility for accepting members' requests to pay receive bigger loans</a:t>
+              <a:t>Inability to fulfill members' requests for bigger loan disbursements</a:t>
             </a:r>
           </a:p>
           <a:p>
@@ -21090,7 +20590,7 @@
                 <a:latin typeface="Times New Roman" panose="02020603050405020304" pitchFamily="18" charset="0"/>
                 <a:cs typeface="B Nazanin" panose="00000400000000000000" pitchFamily="2" charset="-78"/>
               </a:rPr>
-              <a:t>Paying members' loans in equal amounts during a period</a:t>
+              <a:t>Equal installment payments for members' loans over a period</a:t>
             </a:r>
           </a:p>
           <a:p>
@@ -21102,7 +20602,7 @@
                 <a:latin typeface="Times New Roman" panose="02020603050405020304" pitchFamily="18" charset="0"/>
                 <a:cs typeface="B Nazanin" panose="00000400000000000000" pitchFamily="2" charset="-78"/>
               </a:rPr>
-              <a:t>Ignoring annual inflation</a:t>
+              <a:t>Ignoring annual inflation rates</a:t>
             </a:r>
             <a:endParaRPr lang="en-US" sz="2000" dirty="0">
               <a:solidFill>
@@ -21405,6 +20905,55 @@
                       </p:childTnLst>
                     </p:cTn>
                   </p:par>
+                  <p:par>
+                    <p:cTn id="23" fill="hold">
+                      <p:stCondLst>
+                        <p:cond delay="indefinite"/>
+                      </p:stCondLst>
+                      <p:childTnLst>
+                        <p:par>
+                          <p:cTn id="24" fill="hold">
+                            <p:stCondLst>
+                              <p:cond delay="0"/>
+                            </p:stCondLst>
+                            <p:childTnLst>
+                              <p:par>
+                                <p:cTn id="25" presetID="1" presetClass="entr" presetSubtype="0" fill="hold" grpId="0" nodeType="clickEffect">
+                                  <p:stCondLst>
+                                    <p:cond delay="0"/>
+                                  </p:stCondLst>
+                                  <p:childTnLst>
+                                    <p:set>
+                                      <p:cBhvr>
+                                        <p:cTn id="26" dur="1" fill="hold">
+                                          <p:stCondLst>
+                                            <p:cond delay="0"/>
+                                          </p:stCondLst>
+                                        </p:cTn>
+                                        <p:tgtEl>
+                                          <p:spTgt spid="3">
+                                            <p:txEl>
+                                              <p:pRg st="5" end="5"/>
+                                            </p:txEl>
+                                          </p:spTgt>
+                                        </p:tgtEl>
+                                        <p:attrNameLst>
+                                          <p:attrName>style.visibility</p:attrName>
+                                        </p:attrNameLst>
+                                      </p:cBhvr>
+                                      <p:to>
+                                        <p:strVal val="visible"/>
+                                      </p:to>
+                                    </p:set>
+                                  </p:childTnLst>
+                                </p:cTn>
+                              </p:par>
+                            </p:childTnLst>
+                          </p:cTn>
+                        </p:par>
+                      </p:childTnLst>
+                    </p:cTn>
+                  </p:par>
                 </p:childTnLst>
               </p:cTn>
               <p:prevCondLst>
@@ -21469,7 +21018,7 @@
         <p:spPr>
           <a:xfrm>
             <a:off x="1142999" y="609600"/>
-            <a:ext cx="10075277" cy="1356360"/>
+            <a:ext cx="9522955" cy="1356360"/>
           </a:xfrm>
         </p:spPr>
         <p:txBody>
@@ -21484,7 +21033,7 @@
                 <a:latin typeface="Times New Roman" panose="02020603050405020304" pitchFamily="18" charset="0"/>
                 <a:cs typeface="B Nazanin" panose="00000400000000000000" pitchFamily="2" charset="-78"/>
               </a:rPr>
-              <a:t>The Solution for User Part (Project’s Purpose)</a:t>
+              <a:t>The Solution to User Experience Drawbacks (Project’s Purpose)</a:t>
             </a:r>
           </a:p>
         </p:txBody>
@@ -21505,7 +21054,12 @@
             <p:ph idx="1"/>
           </p:nvPr>
         </p:nvSpPr>
-        <p:spPr/>
+        <p:spPr>
+          <a:xfrm>
+            <a:off x="1143000" y="2057400"/>
+            <a:ext cx="10216426" cy="4038600"/>
+          </a:xfrm>
+        </p:spPr>
         <p:txBody>
           <a:bodyPr anchor="ctr">
             <a:normAutofit/>
@@ -21520,7 +21074,7 @@
                 <a:latin typeface="Times New Roman" panose="02020603050405020304" pitchFamily="18" charset="0"/>
                 <a:cs typeface="B Nazanin" panose="00000400000000000000" pitchFamily="2" charset="-78"/>
               </a:rPr>
-              <a:t>Members ability to see the loan’s receiving date and its amount</a:t>
+              <a:t>Allow members to view the loan's disbursement date and amount</a:t>
             </a:r>
           </a:p>
           <a:p>
@@ -21532,7 +21086,7 @@
                 <a:latin typeface="Times New Roman" panose="02020603050405020304" pitchFamily="18" charset="0"/>
                 <a:cs typeface="B Nazanin" panose="00000400000000000000" pitchFamily="2" charset="-78"/>
               </a:rPr>
-              <a:t>Members ability to view their account and remaining debts</a:t>
+              <a:t>Enable members to access their accounts and view outstanding debts</a:t>
             </a:r>
           </a:p>
           <a:p>
@@ -21544,7 +21098,7 @@
                 <a:latin typeface="Times New Roman" panose="02020603050405020304" pitchFamily="18" charset="0"/>
                 <a:cs typeface="B Nazanin" panose="00000400000000000000" pitchFamily="2" charset="-78"/>
               </a:rPr>
-              <a:t>Defining a role for the family manager to handle family members’ accounts</a:t>
+              <a:t>Introduce a family manager role to manage family members' accounts</a:t>
             </a:r>
           </a:p>
           <a:p>
@@ -21556,7 +21110,7 @@
                 <a:latin typeface="Times New Roman" panose="02020603050405020304" pitchFamily="18" charset="0"/>
                 <a:cs typeface="B Nazanin" panose="00000400000000000000" pitchFamily="2" charset="-78"/>
               </a:rPr>
-              <a:t>A possibility for members to determine the savings share for the loan amount </a:t>
+              <a:t>Provide the option to allocate a portion of members’ savings for loan repayment</a:t>
             </a:r>
           </a:p>
           <a:p>
@@ -21568,7 +21122,7 @@
                 <a:latin typeface="Times New Roman" panose="02020603050405020304" pitchFamily="18" charset="0"/>
                 <a:cs typeface="B Nazanin" panose="00000400000000000000" pitchFamily="2" charset="-78"/>
               </a:rPr>
-              <a:t>Determining the loan amount of members according to their savings</a:t>
+              <a:t>Determine members' loan amounts based on their savings contributions</a:t>
             </a:r>
           </a:p>
           <a:p>
@@ -21580,7 +21134,7 @@
                 <a:latin typeface="Times New Roman" panose="02020603050405020304" pitchFamily="18" charset="0"/>
                 <a:cs typeface="B Nazanin" panose="00000400000000000000" pitchFamily="2" charset="-78"/>
               </a:rPr>
-              <a:t>Calculating annual inflation for members' savings</a:t>
+              <a:t>Implement annual inflation calculation for members' savings</a:t>
             </a:r>
             <a:endParaRPr lang="fa-IR" sz="2400" dirty="0">
               <a:solidFill>
@@ -21883,6 +21437,55 @@
                       </p:childTnLst>
                     </p:cTn>
                   </p:par>
+                  <p:par>
+                    <p:cTn id="23" fill="hold">
+                      <p:stCondLst>
+                        <p:cond delay="indefinite"/>
+                      </p:stCondLst>
+                      <p:childTnLst>
+                        <p:par>
+                          <p:cTn id="24" fill="hold">
+                            <p:stCondLst>
+                              <p:cond delay="0"/>
+                            </p:stCondLst>
+                            <p:childTnLst>
+                              <p:par>
+                                <p:cTn id="25" presetID="1" presetClass="entr" presetSubtype="0" fill="hold" grpId="0" nodeType="clickEffect">
+                                  <p:stCondLst>
+                                    <p:cond delay="0"/>
+                                  </p:stCondLst>
+                                  <p:childTnLst>
+                                    <p:set>
+                                      <p:cBhvr>
+                                        <p:cTn id="26" dur="1" fill="hold">
+                                          <p:stCondLst>
+                                            <p:cond delay="0"/>
+                                          </p:stCondLst>
+                                        </p:cTn>
+                                        <p:tgtEl>
+                                          <p:spTgt spid="3">
+                                            <p:txEl>
+                                              <p:pRg st="5" end="5"/>
+                                            </p:txEl>
+                                          </p:spTgt>
+                                        </p:tgtEl>
+                                        <p:attrNameLst>
+                                          <p:attrName>style.visibility</p:attrName>
+                                        </p:attrNameLst>
+                                      </p:cBhvr>
+                                      <p:to>
+                                        <p:strVal val="visible"/>
+                                      </p:to>
+                                    </p:set>
+                                  </p:childTnLst>
+                                </p:cTn>
+                              </p:par>
+                            </p:childTnLst>
+                          </p:cTn>
+                        </p:par>
+                      </p:childTnLst>
+                    </p:cTn>
+                  </p:par>
                 </p:childTnLst>
               </p:cTn>
               <p:prevCondLst>
@@ -21993,15 +21596,8 @@
                 <a:latin typeface="Times New Roman" panose="02020603050405020304" pitchFamily="18" charset="0"/>
                 <a:cs typeface="B Nazanin" panose="00000400000000000000" pitchFamily="2" charset="-78"/>
               </a:rPr>
-              <a:t> Application Deployment Architecture </a:t>
-            </a:r>
-            <a:endParaRPr lang="fa-IR" sz="2400" dirty="0">
-              <a:solidFill>
-                <a:schemeClr val="tx1"/>
-              </a:solidFill>
-              <a:latin typeface="Times New Roman" panose="02020603050405020304" pitchFamily="18" charset="0"/>
-              <a:cs typeface="B Nazanin" panose="00000400000000000000" pitchFamily="2" charset="-78"/>
-            </a:endParaRPr>
+              <a:t>Application Deployment Architecture</a:t>
+            </a:r>
           </a:p>
           <a:p>
             <a:r>
@@ -22012,7 +21608,7 @@
                 <a:latin typeface="Times New Roman" panose="02020603050405020304" pitchFamily="18" charset="0"/>
                 <a:cs typeface="B Nazanin" panose="00000400000000000000" pitchFamily="2" charset="-78"/>
               </a:rPr>
-              <a:t> Three-Tier Architecture</a:t>
+              <a:t>Implementation of Three-Tier Architecture</a:t>
             </a:r>
             <a:endParaRPr lang="fa-IR" sz="2400" dirty="0">
               <a:solidFill>
@@ -22168,7 +21764,7 @@
                             </p:stCondLst>
                             <p:childTnLst>
                               <p:par>
-                                <p:cTn id="9" presetID="1" presetClass="entr" presetSubtype="0" fill="hold" nodeType="clickEffect">
+                                <p:cTn id="9" presetID="1" presetClass="entr" presetSubtype="0" fill="hold" grpId="0" nodeType="clickEffect">
                                   <p:stCondLst>
                                     <p:cond delay="0"/>
                                   </p:stCondLst>
@@ -22176,6 +21772,55 @@
                                     <p:set>
                                       <p:cBhvr>
                                         <p:cTn id="10" dur="1" fill="hold">
+                                          <p:stCondLst>
+                                            <p:cond delay="0"/>
+                                          </p:stCondLst>
+                                        </p:cTn>
+                                        <p:tgtEl>
+                                          <p:spTgt spid="3">
+                                            <p:txEl>
+                                              <p:pRg st="1" end="1"/>
+                                            </p:txEl>
+                                          </p:spTgt>
+                                        </p:tgtEl>
+                                        <p:attrNameLst>
+                                          <p:attrName>style.visibility</p:attrName>
+                                        </p:attrNameLst>
+                                      </p:cBhvr>
+                                      <p:to>
+                                        <p:strVal val="visible"/>
+                                      </p:to>
+                                    </p:set>
+                                  </p:childTnLst>
+                                </p:cTn>
+                              </p:par>
+                            </p:childTnLst>
+                          </p:cTn>
+                        </p:par>
+                      </p:childTnLst>
+                    </p:cTn>
+                  </p:par>
+                  <p:par>
+                    <p:cTn id="11" fill="hold">
+                      <p:stCondLst>
+                        <p:cond delay="indefinite"/>
+                      </p:stCondLst>
+                      <p:childTnLst>
+                        <p:par>
+                          <p:cTn id="12" fill="hold">
+                            <p:stCondLst>
+                              <p:cond delay="0"/>
+                            </p:stCondLst>
+                            <p:childTnLst>
+                              <p:par>
+                                <p:cTn id="13" presetID="1" presetClass="entr" presetSubtype="0" fill="hold" nodeType="clickEffect">
+                                  <p:stCondLst>
+                                    <p:cond delay="0"/>
+                                  </p:stCondLst>
+                                  <p:childTnLst>
+                                    <p:set>
+                                      <p:cBhvr>
+                                        <p:cTn id="14" dur="1" fill="hold">
                                           <p:stCondLst>
                                             <p:cond delay="0"/>
                                           </p:stCondLst>

</xml_diff>